<commit_message>
Construction de la matrice A
</commit_message>
<xml_diff>
--- a/Images/Figure.pptx
+++ b/Images/Figure.pptx
@@ -14802,6 +14802,44 @@
           </a:p>
         </p:txBody>
       </p:sp>
+      <p:sp>
+        <p:nvSpPr>
+          <p:cNvPr id="2" name="ZoneTexte 1">
+            <a:extLst>
+              <a:ext uri="{FF2B5EF4-FFF2-40B4-BE49-F238E27FC236}">
+                <a16:creationId xmlns:a16="http://schemas.microsoft.com/office/drawing/2014/main" id="{93998ED5-9CC7-654D-81CC-245CD031A618}"/>
+              </a:ext>
+            </a:extLst>
+          </p:cNvPr>
+          <p:cNvSpPr txBox="1"/>
+          <p:nvPr/>
+        </p:nvSpPr>
+        <p:spPr>
+          <a:xfrm>
+            <a:off x="511629" y="1872343"/>
+            <a:ext cx="715260" cy="646331"/>
+          </a:xfrm>
+          <a:prstGeom prst="rect">
+            <a:avLst/>
+          </a:prstGeom>
+          <a:noFill/>
+        </p:spPr>
+        <p:txBody>
+          <a:bodyPr wrap="none" rtlCol="0">
+            <a:spAutoFit/>
+          </a:bodyPr>
+          <a:lstStyle/>
+          <a:p>
+            <a:r>
+              <a:rPr lang="en-CA" dirty="0"/>
+              <a:t>PML2</a:t>
+            </a:r>
+          </a:p>
+          <a:p>
+            <a:endParaRPr lang="en-CA" dirty="0"/>
+          </a:p>
+        </p:txBody>
+      </p:sp>
     </p:spTree>
     <p:extLst>
       <p:ext uri="{BB962C8B-B14F-4D97-AF65-F5344CB8AC3E}">

</xml_diff>

<commit_message>
Modification pour faire des sweeps de fréquence
</commit_message>
<xml_diff>
--- a/Images/Figure.pptx
+++ b/Images/Figure.pptx
@@ -3328,7 +3328,7 @@
           <a:p>
             <a:fld id="{481B85EB-1E56-644C-8640-446B4C18672D}" type="datetimeFigureOut">
               <a:rPr lang="en-CA" smtClean="0"/>
-              <a:t>2020-03-26</a:t>
+              <a:t>2020-04-03</a:t>
             </a:fld>
             <a:endParaRPr lang="en-CA"/>
           </a:p>
@@ -3913,7 +3913,7 @@
           <a:p>
             <a:fld id="{AAD469DD-E0EC-B64D-A18A-F46A4583D77F}" type="datetimeFigureOut">
               <a:rPr lang="en-CA" smtClean="0"/>
-              <a:t>2020-03-26</a:t>
+              <a:t>2020-04-03</a:t>
             </a:fld>
             <a:endParaRPr lang="en-CA"/>
           </a:p>
@@ -4113,7 +4113,7 @@
           <a:p>
             <a:fld id="{AAD469DD-E0EC-B64D-A18A-F46A4583D77F}" type="datetimeFigureOut">
               <a:rPr lang="en-CA" smtClean="0"/>
-              <a:t>2020-03-26</a:t>
+              <a:t>2020-04-03</a:t>
             </a:fld>
             <a:endParaRPr lang="en-CA"/>
           </a:p>
@@ -4323,7 +4323,7 @@
           <a:p>
             <a:fld id="{AAD469DD-E0EC-B64D-A18A-F46A4583D77F}" type="datetimeFigureOut">
               <a:rPr lang="en-CA" smtClean="0"/>
-              <a:t>2020-03-26</a:t>
+              <a:t>2020-04-03</a:t>
             </a:fld>
             <a:endParaRPr lang="en-CA"/>
           </a:p>
@@ -4523,7 +4523,7 @@
           <a:p>
             <a:fld id="{AAD469DD-E0EC-B64D-A18A-F46A4583D77F}" type="datetimeFigureOut">
               <a:rPr lang="en-CA" smtClean="0"/>
-              <a:t>2020-03-26</a:t>
+              <a:t>2020-04-03</a:t>
             </a:fld>
             <a:endParaRPr lang="en-CA"/>
           </a:p>
@@ -4799,7 +4799,7 @@
           <a:p>
             <a:fld id="{AAD469DD-E0EC-B64D-A18A-F46A4583D77F}" type="datetimeFigureOut">
               <a:rPr lang="en-CA" smtClean="0"/>
-              <a:t>2020-03-26</a:t>
+              <a:t>2020-04-03</a:t>
             </a:fld>
             <a:endParaRPr lang="en-CA"/>
           </a:p>
@@ -5067,7 +5067,7 @@
           <a:p>
             <a:fld id="{AAD469DD-E0EC-B64D-A18A-F46A4583D77F}" type="datetimeFigureOut">
               <a:rPr lang="en-CA" smtClean="0"/>
-              <a:t>2020-03-26</a:t>
+              <a:t>2020-04-03</a:t>
             </a:fld>
             <a:endParaRPr lang="en-CA"/>
           </a:p>
@@ -5482,7 +5482,7 @@
           <a:p>
             <a:fld id="{AAD469DD-E0EC-B64D-A18A-F46A4583D77F}" type="datetimeFigureOut">
               <a:rPr lang="en-CA" smtClean="0"/>
-              <a:t>2020-03-26</a:t>
+              <a:t>2020-04-03</a:t>
             </a:fld>
             <a:endParaRPr lang="en-CA"/>
           </a:p>
@@ -5624,7 +5624,7 @@
           <a:p>
             <a:fld id="{AAD469DD-E0EC-B64D-A18A-F46A4583D77F}" type="datetimeFigureOut">
               <a:rPr lang="en-CA" smtClean="0"/>
-              <a:t>2020-03-26</a:t>
+              <a:t>2020-04-03</a:t>
             </a:fld>
             <a:endParaRPr lang="en-CA"/>
           </a:p>
@@ -5737,7 +5737,7 @@
           <a:p>
             <a:fld id="{AAD469DD-E0EC-B64D-A18A-F46A4583D77F}" type="datetimeFigureOut">
               <a:rPr lang="en-CA" smtClean="0"/>
-              <a:t>2020-03-26</a:t>
+              <a:t>2020-04-03</a:t>
             </a:fld>
             <a:endParaRPr lang="en-CA"/>
           </a:p>
@@ -6050,7 +6050,7 @@
           <a:p>
             <a:fld id="{AAD469DD-E0EC-B64D-A18A-F46A4583D77F}" type="datetimeFigureOut">
               <a:rPr lang="en-CA" smtClean="0"/>
-              <a:t>2020-03-26</a:t>
+              <a:t>2020-04-03</a:t>
             </a:fld>
             <a:endParaRPr lang="en-CA"/>
           </a:p>
@@ -6339,7 +6339,7 @@
           <a:p>
             <a:fld id="{AAD469DD-E0EC-B64D-A18A-F46A4583D77F}" type="datetimeFigureOut">
               <a:rPr lang="en-CA" smtClean="0"/>
-              <a:t>2020-03-26</a:t>
+              <a:t>2020-04-03</a:t>
             </a:fld>
             <a:endParaRPr lang="en-CA"/>
           </a:p>
@@ -6582,7 +6582,7 @@
           <a:p>
             <a:fld id="{AAD469DD-E0EC-B64D-A18A-F46A4583D77F}" type="datetimeFigureOut">
               <a:rPr lang="en-CA" smtClean="0"/>
-              <a:t>2020-03-26</a:t>
+              <a:t>2020-04-03</a:t>
             </a:fld>
             <a:endParaRPr lang="en-CA"/>
           </a:p>
@@ -14498,8 +14498,8 @@
           </a:p>
         </p:txBody>
       </p:sp>
-      <mc:AlternateContent xmlns:mc="http://schemas.openxmlformats.org/markup-compatibility/2006">
-        <mc:Choice xmlns:a14="http://schemas.microsoft.com/office/drawing/2010/main" Requires="a14">
+      <mc:AlternateContent xmlns:mc="http://schemas.openxmlformats.org/markup-compatibility/2006" xmlns:a14="http://schemas.microsoft.com/office/drawing/2010/main">
+        <mc:Choice Requires="a14">
           <p:sp>
             <p:nvSpPr>
               <p:cNvPr id="34" name="ZoneTexte 33">
@@ -14528,6 +14528,7 @@
               </a:bodyPr>
               <a:lstStyle/>
               <a:p>
+                <a:pPr/>
                 <a14:m>
                   <m:oMathPara xmlns:m="http://schemas.openxmlformats.org/officeDocument/2006/math">
                     <m:oMathParaPr>
@@ -14585,7 +14586,7 @@
             </p:txBody>
           </p:sp>
         </mc:Choice>
-        <mc:Fallback>
+        <mc:Fallback xmlns="">
           <p:sp>
             <p:nvSpPr>
               <p:cNvPr id="34" name="ZoneTexte 33">
@@ -14630,8 +14631,8 @@
           </p:sp>
         </mc:Fallback>
       </mc:AlternateContent>
-      <mc:AlternateContent xmlns:mc="http://schemas.openxmlformats.org/markup-compatibility/2006">
-        <mc:Choice xmlns:a14="http://schemas.microsoft.com/office/drawing/2010/main" Requires="a14">
+      <mc:AlternateContent xmlns:mc="http://schemas.openxmlformats.org/markup-compatibility/2006" xmlns:a14="http://schemas.microsoft.com/office/drawing/2010/main">
+        <mc:Choice Requires="a14">
           <p:sp>
             <p:nvSpPr>
               <p:cNvPr id="35" name="ZoneTexte 34">
@@ -14660,6 +14661,7 @@
               </a:bodyPr>
               <a:lstStyle/>
               <a:p>
+                <a:pPr/>
                 <a14:m>
                   <m:oMathPara xmlns:m="http://schemas.openxmlformats.org/officeDocument/2006/math">
                     <m:oMathParaPr>
@@ -14748,7 +14750,7 @@
             </p:txBody>
           </p:sp>
         </mc:Choice>
-        <mc:Fallback>
+        <mc:Fallback xmlns="">
           <p:sp>
             <p:nvSpPr>
               <p:cNvPr id="35" name="ZoneTexte 34">
@@ -14793,8 +14795,8 @@
           </p:sp>
         </mc:Fallback>
       </mc:AlternateContent>
-      <mc:AlternateContent xmlns:mc="http://schemas.openxmlformats.org/markup-compatibility/2006">
-        <mc:Choice xmlns:a14="http://schemas.microsoft.com/office/drawing/2010/main" Requires="a14">
+      <mc:AlternateContent xmlns:mc="http://schemas.openxmlformats.org/markup-compatibility/2006" xmlns:a14="http://schemas.microsoft.com/office/drawing/2010/main">
+        <mc:Choice Requires="a14">
           <p:sp>
             <p:nvSpPr>
               <p:cNvPr id="36" name="ZoneTexte 35">
@@ -14823,6 +14825,7 @@
               </a:bodyPr>
               <a:lstStyle/>
               <a:p>
+                <a:pPr/>
                 <a14:m>
                   <m:oMathPara xmlns:m="http://schemas.openxmlformats.org/officeDocument/2006/math">
                     <m:oMathParaPr>
@@ -14911,7 +14914,7 @@
             </p:txBody>
           </p:sp>
         </mc:Choice>
-        <mc:Fallback>
+        <mc:Fallback xmlns="">
           <p:sp>
             <p:nvSpPr>
               <p:cNvPr id="36" name="ZoneTexte 35">
@@ -14956,8 +14959,8 @@
           </p:sp>
         </mc:Fallback>
       </mc:AlternateContent>
-      <mc:AlternateContent xmlns:mc="http://schemas.openxmlformats.org/markup-compatibility/2006">
-        <mc:Choice xmlns:a14="http://schemas.microsoft.com/office/drawing/2010/main" Requires="a14">
+      <mc:AlternateContent xmlns:mc="http://schemas.openxmlformats.org/markup-compatibility/2006" xmlns:a14="http://schemas.microsoft.com/office/drawing/2010/main">
+        <mc:Choice Requires="a14">
           <p:sp>
             <p:nvSpPr>
               <p:cNvPr id="41" name="ZoneTexte 40">
@@ -14986,6 +14989,7 @@
               </a:bodyPr>
               <a:lstStyle/>
               <a:p>
+                <a:pPr/>
                 <a14:m>
                   <m:oMathPara xmlns:m="http://schemas.openxmlformats.org/officeDocument/2006/math">
                     <m:oMathParaPr>
@@ -15105,7 +15109,7 @@
             </p:txBody>
           </p:sp>
         </mc:Choice>
-        <mc:Fallback>
+        <mc:Fallback xmlns="">
           <p:sp>
             <p:nvSpPr>
               <p:cNvPr id="41" name="ZoneTexte 40">
@@ -15193,8 +15197,8 @@
           </a:fontRef>
         </p:style>
       </p:cxnSp>
-      <mc:AlternateContent xmlns:mc="http://schemas.openxmlformats.org/markup-compatibility/2006">
-        <mc:Choice xmlns:a14="http://schemas.microsoft.com/office/drawing/2010/main" Requires="a14">
+      <mc:AlternateContent xmlns:mc="http://schemas.openxmlformats.org/markup-compatibility/2006" xmlns:a14="http://schemas.microsoft.com/office/drawing/2010/main">
+        <mc:Choice Requires="a14">
           <p:sp>
             <p:nvSpPr>
               <p:cNvPr id="44" name="ZoneTexte 43">
@@ -15223,6 +15227,7 @@
               </a:bodyPr>
               <a:lstStyle/>
               <a:p>
+                <a:pPr/>
                 <a14:m>
                   <m:oMathPara xmlns:m="http://schemas.openxmlformats.org/officeDocument/2006/math">
                     <m:oMathParaPr>
@@ -15262,7 +15267,7 @@
             </p:txBody>
           </p:sp>
         </mc:Choice>
-        <mc:Fallback>
+        <mc:Fallback xmlns="">
           <p:sp>
             <p:nvSpPr>
               <p:cNvPr id="44" name="ZoneTexte 43">
@@ -15352,8 +15357,8 @@
           </a:fontRef>
         </p:style>
       </p:cxnSp>
-      <mc:AlternateContent xmlns:mc="http://schemas.openxmlformats.org/markup-compatibility/2006">
-        <mc:Choice xmlns:a14="http://schemas.microsoft.com/office/drawing/2010/main" Requires="a14">
+      <mc:AlternateContent xmlns:mc="http://schemas.openxmlformats.org/markup-compatibility/2006" xmlns:a14="http://schemas.microsoft.com/office/drawing/2010/main">
+        <mc:Choice Requires="a14">
           <p:sp>
             <p:nvSpPr>
               <p:cNvPr id="46" name="ZoneTexte 45">
@@ -15382,6 +15387,7 @@
               </a:bodyPr>
               <a:lstStyle/>
               <a:p>
+                <a:pPr/>
                 <a14:m>
                   <m:oMathPara xmlns:m="http://schemas.openxmlformats.org/officeDocument/2006/math">
                     <m:oMathParaPr>
@@ -15421,7 +15427,7 @@
             </p:txBody>
           </p:sp>
         </mc:Choice>
-        <mc:Fallback>
+        <mc:Fallback xmlns="">
           <p:sp>
             <p:nvSpPr>
               <p:cNvPr id="46" name="ZoneTexte 45">
@@ -15515,8 +15521,8 @@
           </a:p>
         </p:txBody>
       </p:sp>
-      <mc:AlternateContent xmlns:mc="http://schemas.openxmlformats.org/markup-compatibility/2006">
-        <mc:Choice xmlns:a14="http://schemas.microsoft.com/office/drawing/2010/main" Requires="a14">
+      <mc:AlternateContent xmlns:mc="http://schemas.openxmlformats.org/markup-compatibility/2006" xmlns:a14="http://schemas.microsoft.com/office/drawing/2010/main">
+        <mc:Choice Requires="a14">
           <p:sp>
             <p:nvSpPr>
               <p:cNvPr id="50" name="ZoneTexte 49">
@@ -15582,7 +15588,7 @@
             </p:txBody>
           </p:sp>
         </mc:Choice>
-        <mc:Fallback>
+        <mc:Fallback xmlns="">
           <p:sp>
             <p:nvSpPr>
               <p:cNvPr id="50" name="ZoneTexte 49">
@@ -15679,8 +15685,8 @@
           </a:p>
         </p:txBody>
       </p:sp>
-      <mc:AlternateContent xmlns:mc="http://schemas.openxmlformats.org/markup-compatibility/2006">
-        <mc:Choice xmlns:a14="http://schemas.microsoft.com/office/drawing/2010/main" Requires="a14">
+      <mc:AlternateContent xmlns:mc="http://schemas.openxmlformats.org/markup-compatibility/2006" xmlns:a14="http://schemas.microsoft.com/office/drawing/2010/main">
+        <mc:Choice Requires="a14">
           <p:sp>
             <p:nvSpPr>
               <p:cNvPr id="52" name="ZoneTexte 51">
@@ -15746,7 +15752,7 @@
             </p:txBody>
           </p:sp>
         </mc:Choice>
-        <mc:Fallback>
+        <mc:Fallback xmlns="">
           <p:sp>
             <p:nvSpPr>
               <p:cNvPr id="52" name="ZoneTexte 51">
@@ -16425,8 +16431,8 @@
           </a:p>
         </p:txBody>
       </p:sp>
-      <mc:AlternateContent xmlns:mc="http://schemas.openxmlformats.org/markup-compatibility/2006" xmlns:a14="http://schemas.microsoft.com/office/drawing/2010/main">
-        <mc:Choice Requires="a14">
+      <mc:AlternateContent xmlns:mc="http://schemas.openxmlformats.org/markup-compatibility/2006">
+        <mc:Choice xmlns:a14="http://schemas.microsoft.com/office/drawing/2010/main" Requires="a14">
           <p:sp>
             <p:nvSpPr>
               <p:cNvPr id="16" name="ZoneTexte 15">
@@ -16507,7 +16513,7 @@
                               </a:solidFill>
                               <a:latin typeface="Cambria Math" panose="02040503050406030204" pitchFamily="18" charset="0"/>
                             </a:rPr>
-                            <m:t>1</m:t>
+                            <m:t>3</m:t>
                           </m:r>
                         </m:sub>
                       </m:sSub>
@@ -16523,7 +16529,7 @@
             </p:txBody>
           </p:sp>
         </mc:Choice>
-        <mc:Fallback xmlns="">
+        <mc:Fallback>
           <p:sp>
             <p:nvSpPr>
               <p:cNvPr id="16" name="ZoneTexte 15">

</xml_diff>

<commit_message>
petites modifications aux figures
</commit_message>
<xml_diff>
--- a/Images/Figure.pptx
+++ b/Images/Figure.pptx
@@ -19917,10 +19917,10 @@
       </p:grpSpPr>
       <p:grpSp>
         <p:nvGrpSpPr>
-          <p:cNvPr id="7" name="Groupe 6">
+          <p:cNvPr id="5" name="Groupe 4">
             <a:extLst>
               <a:ext uri="{FF2B5EF4-FFF2-40B4-BE49-F238E27FC236}">
-                <a16:creationId xmlns:a16="http://schemas.microsoft.com/office/drawing/2014/main" id="{1AE51F31-70F9-41A4-835B-8786A1F8904A}"/>
+                <a16:creationId xmlns:a16="http://schemas.microsoft.com/office/drawing/2014/main" id="{7EC62B2F-0BF3-4DCD-A47C-4800588FD785}"/>
               </a:ext>
             </a:extLst>
           </p:cNvPr>
@@ -19929,18 +19929,1075 @@
         </p:nvGrpSpPr>
         <p:grpSpPr>
           <a:xfrm>
-            <a:off x="189425" y="217622"/>
+            <a:off x="104870" y="203110"/>
             <a:ext cx="6098959" cy="4134367"/>
-            <a:chOff x="1482571" y="159797"/>
+            <a:chOff x="104870" y="203110"/>
             <a:chExt cx="6098959" cy="4134367"/>
           </a:xfrm>
         </p:grpSpPr>
+        <p:grpSp>
+          <p:nvGrpSpPr>
+            <p:cNvPr id="7" name="Groupe 6">
+              <a:extLst>
+                <a:ext uri="{FF2B5EF4-FFF2-40B4-BE49-F238E27FC236}">
+                  <a16:creationId xmlns:a16="http://schemas.microsoft.com/office/drawing/2014/main" id="{1AE51F31-70F9-41A4-835B-8786A1F8904A}"/>
+                </a:ext>
+              </a:extLst>
+            </p:cNvPr>
+            <p:cNvGrpSpPr/>
+            <p:nvPr/>
+          </p:nvGrpSpPr>
+          <p:grpSpPr>
+            <a:xfrm>
+              <a:off x="104870" y="203110"/>
+              <a:ext cx="6098959" cy="4134367"/>
+              <a:chOff x="1482571" y="159797"/>
+              <a:chExt cx="6098959" cy="4134367"/>
+            </a:xfrm>
+          </p:grpSpPr>
+          <p:sp>
+            <p:nvSpPr>
+              <p:cNvPr id="4" name="Rectangle 3">
+                <a:extLst>
+                  <a:ext uri="{FF2B5EF4-FFF2-40B4-BE49-F238E27FC236}">
+                    <a16:creationId xmlns:a16="http://schemas.microsoft.com/office/drawing/2014/main" id="{4A62991C-3002-B141-BAD5-7467C3630633}"/>
+                  </a:ext>
+                </a:extLst>
+              </p:cNvPr>
+              <p:cNvSpPr/>
+              <p:nvPr/>
+            </p:nvSpPr>
+            <p:spPr>
+              <a:xfrm>
+                <a:off x="1482571" y="159797"/>
+                <a:ext cx="6098959" cy="4134367"/>
+              </a:xfrm>
+              <a:prstGeom prst="rect">
+                <a:avLst/>
+              </a:prstGeom>
+            </p:spPr>
+            <p:style>
+              <a:lnRef idx="2">
+                <a:schemeClr val="accent1">
+                  <a:shade val="50000"/>
+                </a:schemeClr>
+              </a:lnRef>
+              <a:fillRef idx="1">
+                <a:schemeClr val="accent1"/>
+              </a:fillRef>
+              <a:effectRef idx="0">
+                <a:schemeClr val="accent1"/>
+              </a:effectRef>
+              <a:fontRef idx="minor">
+                <a:schemeClr val="lt1"/>
+              </a:fontRef>
+            </p:style>
+            <p:txBody>
+              <a:bodyPr rtlCol="0" anchor="ctr"/>
+              <a:lstStyle/>
+              <a:p>
+                <a:pPr algn="ctr"/>
+                <a:endParaRPr lang="en-CA" sz="2400" dirty="0"/>
+              </a:p>
+            </p:txBody>
+          </p:sp>
+          <p:cxnSp>
+            <p:nvCxnSpPr>
+              <p:cNvPr id="19" name="Connecteur droit avec flèche 18">
+                <a:extLst>
+                  <a:ext uri="{FF2B5EF4-FFF2-40B4-BE49-F238E27FC236}">
+                    <a16:creationId xmlns:a16="http://schemas.microsoft.com/office/drawing/2014/main" id="{0230423D-46B4-6D4F-8282-94E72682E252}"/>
+                  </a:ext>
+                </a:extLst>
+              </p:cNvPr>
+              <p:cNvCxnSpPr>
+                <a:cxnSpLocks/>
+              </p:cNvCxnSpPr>
+              <p:nvPr/>
+            </p:nvCxnSpPr>
+            <p:spPr>
+              <a:xfrm flipV="1">
+                <a:off x="5655116" y="2095130"/>
+                <a:ext cx="645614" cy="503231"/>
+              </a:xfrm>
+              <a:prstGeom prst="straightConnector1">
+                <a:avLst/>
+              </a:prstGeom>
+              <a:ln w="38100">
+                <a:solidFill>
+                  <a:schemeClr val="bg1"/>
+                </a:solidFill>
+                <a:tailEnd type="triangle"/>
+              </a:ln>
+            </p:spPr>
+            <p:style>
+              <a:lnRef idx="1">
+                <a:schemeClr val="accent1"/>
+              </a:lnRef>
+              <a:fillRef idx="0">
+                <a:schemeClr val="accent1"/>
+              </a:fillRef>
+              <a:effectRef idx="0">
+                <a:schemeClr val="accent1"/>
+              </a:effectRef>
+              <a:fontRef idx="minor">
+                <a:schemeClr val="tx1"/>
+              </a:fontRef>
+            </p:style>
+          </p:cxnSp>
+          <p:cxnSp>
+            <p:nvCxnSpPr>
+              <p:cNvPr id="21" name="Connecteur droit avec flèche 20">
+                <a:extLst>
+                  <a:ext uri="{FF2B5EF4-FFF2-40B4-BE49-F238E27FC236}">
+                    <a16:creationId xmlns:a16="http://schemas.microsoft.com/office/drawing/2014/main" id="{711D3344-F70F-BC46-9A07-168C12F25AC6}"/>
+                  </a:ext>
+                </a:extLst>
+              </p:cNvPr>
+              <p:cNvCxnSpPr>
+                <a:cxnSpLocks/>
+              </p:cNvCxnSpPr>
+              <p:nvPr/>
+            </p:nvCxnSpPr>
+            <p:spPr>
+              <a:xfrm flipH="1" flipV="1">
+                <a:off x="3210408" y="1999413"/>
+                <a:ext cx="679187" cy="595908"/>
+              </a:xfrm>
+              <a:prstGeom prst="straightConnector1">
+                <a:avLst/>
+              </a:prstGeom>
+              <a:ln w="38100">
+                <a:solidFill>
+                  <a:schemeClr val="bg1"/>
+                </a:solidFill>
+                <a:tailEnd type="triangle"/>
+              </a:ln>
+            </p:spPr>
+            <p:style>
+              <a:lnRef idx="1">
+                <a:schemeClr val="accent1"/>
+              </a:lnRef>
+              <a:fillRef idx="0">
+                <a:schemeClr val="accent1"/>
+              </a:fillRef>
+              <a:effectRef idx="0">
+                <a:schemeClr val="accent1"/>
+              </a:effectRef>
+              <a:fontRef idx="minor">
+                <a:schemeClr val="tx1"/>
+              </a:fontRef>
+            </p:style>
+          </p:cxnSp>
+          <p:cxnSp>
+            <p:nvCxnSpPr>
+              <p:cNvPr id="24" name="Connecteur droit avec flèche 23">
+                <a:extLst>
+                  <a:ext uri="{FF2B5EF4-FFF2-40B4-BE49-F238E27FC236}">
+                    <a16:creationId xmlns:a16="http://schemas.microsoft.com/office/drawing/2014/main" id="{6D4AD4DF-451A-EE4B-9348-45AEFFB6138E}"/>
+                  </a:ext>
+                </a:extLst>
+              </p:cNvPr>
+              <p:cNvCxnSpPr>
+                <a:cxnSpLocks/>
+              </p:cNvCxnSpPr>
+              <p:nvPr/>
+            </p:nvCxnSpPr>
+            <p:spPr>
+              <a:xfrm>
+                <a:off x="1909927" y="585388"/>
+                <a:ext cx="1150030" cy="0"/>
+              </a:xfrm>
+              <a:prstGeom prst="straightConnector1">
+                <a:avLst/>
+              </a:prstGeom>
+              <a:ln w="76200">
+                <a:solidFill>
+                  <a:schemeClr val="tx1">
+                    <a:lumMod val="95000"/>
+                    <a:lumOff val="5000"/>
+                  </a:schemeClr>
+                </a:solidFill>
+                <a:tailEnd type="triangle"/>
+              </a:ln>
+            </p:spPr>
+            <p:style>
+              <a:lnRef idx="1">
+                <a:schemeClr val="accent1"/>
+              </a:lnRef>
+              <a:fillRef idx="0">
+                <a:schemeClr val="accent1"/>
+              </a:fillRef>
+              <a:effectRef idx="0">
+                <a:schemeClr val="accent1"/>
+              </a:effectRef>
+              <a:fontRef idx="minor">
+                <a:schemeClr val="tx1"/>
+              </a:fontRef>
+            </p:style>
+          </p:cxnSp>
+          <p:cxnSp>
+            <p:nvCxnSpPr>
+              <p:cNvPr id="25" name="Connecteur droit avec flèche 24">
+                <a:extLst>
+                  <a:ext uri="{FF2B5EF4-FFF2-40B4-BE49-F238E27FC236}">
+                    <a16:creationId xmlns:a16="http://schemas.microsoft.com/office/drawing/2014/main" id="{6FFF3D04-1153-3A40-AFAC-9BBBEE93268D}"/>
+                  </a:ext>
+                </a:extLst>
+              </p:cNvPr>
+              <p:cNvCxnSpPr>
+                <a:cxnSpLocks/>
+              </p:cNvCxnSpPr>
+              <p:nvPr/>
+            </p:nvCxnSpPr>
+            <p:spPr>
+              <a:xfrm>
+                <a:off x="1942585" y="585388"/>
+                <a:ext cx="0" cy="1156946"/>
+              </a:xfrm>
+              <a:prstGeom prst="straightConnector1">
+                <a:avLst/>
+              </a:prstGeom>
+              <a:ln w="76200">
+                <a:solidFill>
+                  <a:schemeClr val="tx1">
+                    <a:lumMod val="95000"/>
+                    <a:lumOff val="5000"/>
+                  </a:schemeClr>
+                </a:solidFill>
+                <a:tailEnd type="triangle"/>
+              </a:ln>
+            </p:spPr>
+            <p:style>
+              <a:lnRef idx="1">
+                <a:schemeClr val="accent1"/>
+              </a:lnRef>
+              <a:fillRef idx="0">
+                <a:schemeClr val="accent1"/>
+              </a:fillRef>
+              <a:effectRef idx="0">
+                <a:schemeClr val="accent1"/>
+              </a:effectRef>
+              <a:fontRef idx="minor">
+                <a:schemeClr val="tx1"/>
+              </a:fontRef>
+            </p:style>
+          </p:cxnSp>
+          <p:sp>
+            <p:nvSpPr>
+              <p:cNvPr id="26" name="ZoneTexte 25">
+                <a:extLst>
+                  <a:ext uri="{FF2B5EF4-FFF2-40B4-BE49-F238E27FC236}">
+                    <a16:creationId xmlns:a16="http://schemas.microsoft.com/office/drawing/2014/main" id="{C450F287-C5CF-5547-AFE4-22C8D92AE2F7}"/>
+                  </a:ext>
+                </a:extLst>
+              </p:cNvPr>
+              <p:cNvSpPr txBox="1"/>
+              <p:nvPr/>
+            </p:nvSpPr>
+            <p:spPr>
+              <a:xfrm>
+                <a:off x="3182732" y="465393"/>
+                <a:ext cx="533400" cy="646331"/>
+              </a:xfrm>
+              <a:prstGeom prst="rect">
+                <a:avLst/>
+              </a:prstGeom>
+              <a:noFill/>
+            </p:spPr>
+            <p:txBody>
+              <a:bodyPr wrap="square" rtlCol="0">
+                <a:spAutoFit/>
+              </a:bodyPr>
+              <a:lstStyle/>
+              <a:p>
+                <a:r>
+                  <a:rPr lang="en-CA" sz="3600" dirty="0"/>
+                  <a:t>x</a:t>
+                </a:r>
+              </a:p>
+            </p:txBody>
+          </p:sp>
+          <p:sp>
+            <p:nvSpPr>
+              <p:cNvPr id="27" name="ZoneTexte 26">
+                <a:extLst>
+                  <a:ext uri="{FF2B5EF4-FFF2-40B4-BE49-F238E27FC236}">
+                    <a16:creationId xmlns:a16="http://schemas.microsoft.com/office/drawing/2014/main" id="{C72250FA-04FC-2243-A1DE-824616E3DD78}"/>
+                  </a:ext>
+                </a:extLst>
+              </p:cNvPr>
+              <p:cNvSpPr txBox="1"/>
+              <p:nvPr/>
+            </p:nvSpPr>
+            <p:spPr>
+              <a:xfrm>
+                <a:off x="1906072" y="1692250"/>
+                <a:ext cx="533400" cy="584775"/>
+              </a:xfrm>
+              <a:prstGeom prst="rect">
+                <a:avLst/>
+              </a:prstGeom>
+              <a:noFill/>
+            </p:spPr>
+            <p:txBody>
+              <a:bodyPr wrap="square" rtlCol="0">
+                <a:spAutoFit/>
+              </a:bodyPr>
+              <a:lstStyle/>
+              <a:p>
+                <a:r>
+                  <a:rPr lang="en-CA" sz="3200" dirty="0"/>
+                  <a:t>y</a:t>
+                </a:r>
+              </a:p>
+            </p:txBody>
+          </p:sp>
+          <mc:AlternateContent xmlns:mc="http://schemas.openxmlformats.org/markup-compatibility/2006" xmlns:a14="http://schemas.microsoft.com/office/drawing/2010/main">
+            <mc:Choice Requires="a14">
+              <p:sp>
+                <p:nvSpPr>
+                  <p:cNvPr id="28" name="ZoneTexte 27">
+                    <a:extLst>
+                      <a:ext uri="{FF2B5EF4-FFF2-40B4-BE49-F238E27FC236}">
+                        <a16:creationId xmlns:a16="http://schemas.microsoft.com/office/drawing/2014/main" id="{B14F0718-5DAE-874E-B1BC-14AB5CD09A31}"/>
+                      </a:ext>
+                    </a:extLst>
+                  </p:cNvPr>
+                  <p:cNvSpPr txBox="1"/>
+                  <p:nvPr/>
+                </p:nvSpPr>
+                <p:spPr>
+                  <a:xfrm>
+                    <a:off x="5926374" y="1578602"/>
+                    <a:ext cx="1107280" cy="523220"/>
+                  </a:xfrm>
+                  <a:prstGeom prst="rect">
+                    <a:avLst/>
+                  </a:prstGeom>
+                  <a:noFill/>
+                </p:spPr>
+                <p:txBody>
+                  <a:bodyPr wrap="square" rtlCol="0">
+                    <a:spAutoFit/>
+                  </a:bodyPr>
+                  <a:lstStyle/>
+                  <a:p>
+                    <a:pPr/>
+                    <a14:m>
+                      <m:oMathPara xmlns:m="http://schemas.openxmlformats.org/officeDocument/2006/math">
+                        <m:oMathParaPr>
+                          <m:jc m:val="centerGroup"/>
+                        </m:oMathParaPr>
+                        <m:oMath xmlns:m="http://schemas.openxmlformats.org/officeDocument/2006/math">
+                          <m:sSub>
+                            <m:sSubPr>
+                              <m:ctrlPr>
+                                <a:rPr lang="fr-CA" sz="2800" b="0" i="1" smtClean="0">
+                                  <a:solidFill>
+                                    <a:schemeClr val="bg1"/>
+                                  </a:solidFill>
+                                  <a:latin typeface="Cambria Math" panose="02040503050406030204" pitchFamily="18" charset="0"/>
+                                </a:rPr>
+                              </m:ctrlPr>
+                            </m:sSubPr>
+                            <m:e>
+                              <m:acc>
+                                <m:accPr>
+                                  <m:chr m:val="̂"/>
+                                  <m:ctrlPr>
+                                    <a:rPr lang="fr-CA" sz="2800" b="0" i="1" smtClean="0">
+                                      <a:solidFill>
+                                        <a:schemeClr val="bg1"/>
+                                      </a:solidFill>
+                                      <a:latin typeface="Cambria Math" panose="02040503050406030204" pitchFamily="18" charset="0"/>
+                                    </a:rPr>
+                                  </m:ctrlPr>
+                                </m:accPr>
+                                <m:e>
+                                  <m:r>
+                                    <a:rPr lang="fr-CA" sz="2800" b="0" i="1" smtClean="0">
+                                      <a:solidFill>
+                                        <a:schemeClr val="bg1"/>
+                                      </a:solidFill>
+                                      <a:latin typeface="Cambria Math" panose="02040503050406030204" pitchFamily="18" charset="0"/>
+                                    </a:rPr>
+                                    <m:t>𝑛</m:t>
+                                  </m:r>
+                                </m:e>
+                              </m:acc>
+                            </m:e>
+                            <m:sub>
+                              <m:r>
+                                <a:rPr lang="fr-CA" sz="2800" b="0" i="1" smtClean="0">
+                                  <a:solidFill>
+                                    <a:schemeClr val="bg1"/>
+                                  </a:solidFill>
+                                  <a:latin typeface="Cambria Math" panose="02040503050406030204" pitchFamily="18" charset="0"/>
+                                </a:rPr>
+                                <m:t>12</m:t>
+                              </m:r>
+                            </m:sub>
+                          </m:sSub>
+                        </m:oMath>
+                      </m:oMathPara>
+                    </a14:m>
+                    <a:endParaRPr lang="en-CA" sz="2800" dirty="0">
+                      <a:solidFill>
+                        <a:schemeClr val="bg1"/>
+                      </a:solidFill>
+                    </a:endParaRPr>
+                  </a:p>
+                </p:txBody>
+              </p:sp>
+            </mc:Choice>
+            <mc:Fallback xmlns="">
+              <p:sp>
+                <p:nvSpPr>
+                  <p:cNvPr id="28" name="ZoneTexte 27">
+                    <a:extLst>
+                      <a:ext uri="{FF2B5EF4-FFF2-40B4-BE49-F238E27FC236}">
+                        <a16:creationId xmlns:a16="http://schemas.microsoft.com/office/drawing/2014/main" id="{B14F0718-5DAE-874E-B1BC-14AB5CD09A31}"/>
+                      </a:ext>
+                    </a:extLst>
+                  </p:cNvPr>
+                  <p:cNvSpPr txBox="1">
+                    <a:spLocks noRot="1" noChangeAspect="1" noMove="1" noResize="1" noEditPoints="1" noAdjustHandles="1" noChangeArrowheads="1" noChangeShapeType="1" noTextEdit="1"/>
+                  </p:cNvSpPr>
+                  <p:nvPr/>
+                </p:nvSpPr>
+                <p:spPr>
+                  <a:xfrm>
+                    <a:off x="5926374" y="1578602"/>
+                    <a:ext cx="1107280" cy="523220"/>
+                  </a:xfrm>
+                  <a:prstGeom prst="rect">
+                    <a:avLst/>
+                  </a:prstGeom>
+                  <a:blipFill>
+                    <a:blip r:embed="rId2"/>
+                    <a:stretch>
+                      <a:fillRect/>
+                    </a:stretch>
+                  </a:blipFill>
+                </p:spPr>
+                <p:txBody>
+                  <a:bodyPr/>
+                  <a:lstStyle/>
+                  <a:p>
+                    <a:r>
+                      <a:rPr lang="fr-CA">
+                        <a:noFill/>
+                      </a:rPr>
+                      <a:t> </a:t>
+                    </a:r>
+                  </a:p>
+                </p:txBody>
+              </p:sp>
+            </mc:Fallback>
+          </mc:AlternateContent>
+          <mc:AlternateContent xmlns:mc="http://schemas.openxmlformats.org/markup-compatibility/2006" xmlns:a14="http://schemas.microsoft.com/office/drawing/2010/main">
+            <mc:Choice Requires="a14">
+              <p:sp>
+                <p:nvSpPr>
+                  <p:cNvPr id="31" name="ZoneTexte 30">
+                    <a:extLst>
+                      <a:ext uri="{FF2B5EF4-FFF2-40B4-BE49-F238E27FC236}">
+                        <a16:creationId xmlns:a16="http://schemas.microsoft.com/office/drawing/2014/main" id="{744B4C27-6A60-CB4B-B4A5-706004BD43A4}"/>
+                      </a:ext>
+                    </a:extLst>
+                  </p:cNvPr>
+                  <p:cNvSpPr txBox="1"/>
+                  <p:nvPr/>
+                </p:nvSpPr>
+                <p:spPr>
+                  <a:xfrm>
+                    <a:off x="2858946" y="1464486"/>
+                    <a:ext cx="1107280" cy="523220"/>
+                  </a:xfrm>
+                  <a:prstGeom prst="rect">
+                    <a:avLst/>
+                  </a:prstGeom>
+                  <a:noFill/>
+                </p:spPr>
+                <p:txBody>
+                  <a:bodyPr wrap="square" rtlCol="0">
+                    <a:spAutoFit/>
+                  </a:bodyPr>
+                  <a:lstStyle/>
+                  <a:p>
+                    <a:pPr/>
+                    <a14:m>
+                      <m:oMathPara xmlns:m="http://schemas.openxmlformats.org/officeDocument/2006/math">
+                        <m:oMathParaPr>
+                          <m:jc m:val="centerGroup"/>
+                        </m:oMathParaPr>
+                        <m:oMath xmlns:m="http://schemas.openxmlformats.org/officeDocument/2006/math">
+                          <m:sSub>
+                            <m:sSubPr>
+                              <m:ctrlPr>
+                                <a:rPr lang="fr-CA" sz="2800" b="0" i="1" smtClean="0">
+                                  <a:solidFill>
+                                    <a:schemeClr val="bg1"/>
+                                  </a:solidFill>
+                                  <a:latin typeface="Cambria Math" panose="02040503050406030204" pitchFamily="18" charset="0"/>
+                                </a:rPr>
+                              </m:ctrlPr>
+                            </m:sSubPr>
+                            <m:e>
+                              <m:acc>
+                                <m:accPr>
+                                  <m:chr m:val="̂"/>
+                                  <m:ctrlPr>
+                                    <a:rPr lang="fr-CA" sz="2800" b="0" i="1" smtClean="0">
+                                      <a:solidFill>
+                                        <a:schemeClr val="bg1"/>
+                                      </a:solidFill>
+                                      <a:latin typeface="Cambria Math" panose="02040503050406030204" pitchFamily="18" charset="0"/>
+                                    </a:rPr>
+                                  </m:ctrlPr>
+                                </m:accPr>
+                                <m:e>
+                                  <m:r>
+                                    <a:rPr lang="fr-CA" sz="2800" b="0" i="1" smtClean="0">
+                                      <a:solidFill>
+                                        <a:schemeClr val="bg1"/>
+                                      </a:solidFill>
+                                      <a:latin typeface="Cambria Math" panose="02040503050406030204" pitchFamily="18" charset="0"/>
+                                    </a:rPr>
+                                    <m:t>𝑛</m:t>
+                                  </m:r>
+                                </m:e>
+                              </m:acc>
+                            </m:e>
+                            <m:sub>
+                              <m:r>
+                                <a:rPr lang="fr-CA" sz="2800" b="0" i="1" smtClean="0">
+                                  <a:solidFill>
+                                    <a:schemeClr val="bg1"/>
+                                  </a:solidFill>
+                                  <a:latin typeface="Cambria Math" panose="02040503050406030204" pitchFamily="18" charset="0"/>
+                                </a:rPr>
+                                <m:t>11</m:t>
+                              </m:r>
+                            </m:sub>
+                          </m:sSub>
+                        </m:oMath>
+                      </m:oMathPara>
+                    </a14:m>
+                    <a:endParaRPr lang="en-CA" sz="2800" dirty="0">
+                      <a:solidFill>
+                        <a:schemeClr val="bg1"/>
+                      </a:solidFill>
+                    </a:endParaRPr>
+                  </a:p>
+                </p:txBody>
+              </p:sp>
+            </mc:Choice>
+            <mc:Fallback xmlns="">
+              <p:sp>
+                <p:nvSpPr>
+                  <p:cNvPr id="31" name="ZoneTexte 30">
+                    <a:extLst>
+                      <a:ext uri="{FF2B5EF4-FFF2-40B4-BE49-F238E27FC236}">
+                        <a16:creationId xmlns:a16="http://schemas.microsoft.com/office/drawing/2014/main" id="{744B4C27-6A60-CB4B-B4A5-706004BD43A4}"/>
+                      </a:ext>
+                    </a:extLst>
+                  </p:cNvPr>
+                  <p:cNvSpPr txBox="1">
+                    <a:spLocks noRot="1" noChangeAspect="1" noMove="1" noResize="1" noEditPoints="1" noAdjustHandles="1" noChangeArrowheads="1" noChangeShapeType="1" noTextEdit="1"/>
+                  </p:cNvSpPr>
+                  <p:nvPr/>
+                </p:nvSpPr>
+                <p:spPr>
+                  <a:xfrm>
+                    <a:off x="2858946" y="1464486"/>
+                    <a:ext cx="1107280" cy="523220"/>
+                  </a:xfrm>
+                  <a:prstGeom prst="rect">
+                    <a:avLst/>
+                  </a:prstGeom>
+                  <a:blipFill>
+                    <a:blip r:embed="rId3"/>
+                    <a:stretch>
+                      <a:fillRect/>
+                    </a:stretch>
+                  </a:blipFill>
+                </p:spPr>
+                <p:txBody>
+                  <a:bodyPr/>
+                  <a:lstStyle/>
+                  <a:p>
+                    <a:r>
+                      <a:rPr lang="fr-CA">
+                        <a:noFill/>
+                      </a:rPr>
+                      <a:t> </a:t>
+                    </a:r>
+                  </a:p>
+                </p:txBody>
+              </p:sp>
+            </mc:Fallback>
+          </mc:AlternateContent>
+          <p:sp>
+            <p:nvSpPr>
+              <p:cNvPr id="35" name="Triangle 34">
+                <a:extLst>
+                  <a:ext uri="{FF2B5EF4-FFF2-40B4-BE49-F238E27FC236}">
+                    <a16:creationId xmlns:a16="http://schemas.microsoft.com/office/drawing/2014/main" id="{11D2922A-8024-CB44-ABC6-78A4B9486E7C}"/>
+                  </a:ext>
+                </a:extLst>
+              </p:cNvPr>
+              <p:cNvSpPr/>
+              <p:nvPr/>
+            </p:nvSpPr>
+            <p:spPr>
+              <a:xfrm>
+                <a:off x="3060869" y="1517922"/>
+                <a:ext cx="3431863" cy="1989267"/>
+              </a:xfrm>
+              <a:prstGeom prst="triangle">
+                <a:avLst/>
+              </a:prstGeom>
+              <a:solidFill>
+                <a:schemeClr val="accent2"/>
+              </a:solidFill>
+              <a:ln>
+                <a:noFill/>
+              </a:ln>
+            </p:spPr>
+            <p:style>
+              <a:lnRef idx="2">
+                <a:schemeClr val="accent1">
+                  <a:shade val="50000"/>
+                </a:schemeClr>
+              </a:lnRef>
+              <a:fillRef idx="1">
+                <a:schemeClr val="accent1"/>
+              </a:fillRef>
+              <a:effectRef idx="0">
+                <a:schemeClr val="accent1"/>
+              </a:effectRef>
+              <a:fontRef idx="minor">
+                <a:schemeClr val="lt1"/>
+              </a:fontRef>
+            </p:style>
+            <p:txBody>
+              <a:bodyPr rtlCol="0" anchor="ctr"/>
+              <a:lstStyle/>
+              <a:p>
+                <a:pPr algn="ctr"/>
+                <a:endParaRPr lang="en-CA" dirty="0"/>
+              </a:p>
+            </p:txBody>
+          </p:sp>
+          <p:cxnSp>
+            <p:nvCxnSpPr>
+              <p:cNvPr id="37" name="Connecteur droit avec flèche 36">
+                <a:extLst>
+                  <a:ext uri="{FF2B5EF4-FFF2-40B4-BE49-F238E27FC236}">
+                    <a16:creationId xmlns:a16="http://schemas.microsoft.com/office/drawing/2014/main" id="{B744E7BE-6AEA-5A4E-8E98-5545FBB1749A}"/>
+                  </a:ext>
+                </a:extLst>
+              </p:cNvPr>
+              <p:cNvCxnSpPr>
+                <a:cxnSpLocks/>
+              </p:cNvCxnSpPr>
+              <p:nvPr/>
+            </p:nvCxnSpPr>
+            <p:spPr>
+              <a:xfrm flipV="1">
+                <a:off x="4769616" y="825792"/>
+                <a:ext cx="0" cy="504656"/>
+              </a:xfrm>
+              <a:prstGeom prst="straightConnector1">
+                <a:avLst/>
+              </a:prstGeom>
+              <a:ln w="38100">
+                <a:solidFill>
+                  <a:schemeClr val="bg1"/>
+                </a:solidFill>
+                <a:tailEnd type="triangle"/>
+              </a:ln>
+            </p:spPr>
+            <p:style>
+              <a:lnRef idx="1">
+                <a:schemeClr val="accent1"/>
+              </a:lnRef>
+              <a:fillRef idx="0">
+                <a:schemeClr val="accent1"/>
+              </a:fillRef>
+              <a:effectRef idx="0">
+                <a:schemeClr val="accent1"/>
+              </a:effectRef>
+              <a:fontRef idx="minor">
+                <a:schemeClr val="tx1"/>
+              </a:fontRef>
+            </p:style>
+          </p:cxnSp>
+          <mc:AlternateContent xmlns:mc="http://schemas.openxmlformats.org/markup-compatibility/2006" xmlns:a14="http://schemas.microsoft.com/office/drawing/2010/main">
+            <mc:Choice Requires="a14">
+              <p:sp>
+                <p:nvSpPr>
+                  <p:cNvPr id="39" name="ZoneTexte 38">
+                    <a:extLst>
+                      <a:ext uri="{FF2B5EF4-FFF2-40B4-BE49-F238E27FC236}">
+                        <a16:creationId xmlns:a16="http://schemas.microsoft.com/office/drawing/2014/main" id="{E54DF084-0B81-B047-BC53-26CCD183350F}"/>
+                      </a:ext>
+                    </a:extLst>
+                  </p:cNvPr>
+                  <p:cNvSpPr txBox="1"/>
+                  <p:nvPr/>
+                </p:nvSpPr>
+                <p:spPr>
+                  <a:xfrm>
+                    <a:off x="4578228" y="563402"/>
+                    <a:ext cx="1107280" cy="523220"/>
+                  </a:xfrm>
+                  <a:prstGeom prst="rect">
+                    <a:avLst/>
+                  </a:prstGeom>
+                  <a:noFill/>
+                </p:spPr>
+                <p:txBody>
+                  <a:bodyPr wrap="square" rtlCol="0">
+                    <a:spAutoFit/>
+                  </a:bodyPr>
+                  <a:lstStyle/>
+                  <a:p>
+                    <a:pPr/>
+                    <a14:m>
+                      <m:oMathPara xmlns:m="http://schemas.openxmlformats.org/officeDocument/2006/math">
+                        <m:oMathParaPr>
+                          <m:jc m:val="centerGroup"/>
+                        </m:oMathParaPr>
+                        <m:oMath xmlns:m="http://schemas.openxmlformats.org/officeDocument/2006/math">
+                          <m:sSub>
+                            <m:sSubPr>
+                              <m:ctrlPr>
+                                <a:rPr lang="fr-CA" sz="2800" b="0" i="1" smtClean="0">
+                                  <a:solidFill>
+                                    <a:schemeClr val="bg1"/>
+                                  </a:solidFill>
+                                  <a:latin typeface="Cambria Math" panose="02040503050406030204" pitchFamily="18" charset="0"/>
+                                </a:rPr>
+                              </m:ctrlPr>
+                            </m:sSubPr>
+                            <m:e>
+                              <m:acc>
+                                <m:accPr>
+                                  <m:chr m:val="̂"/>
+                                  <m:ctrlPr>
+                                    <a:rPr lang="fr-CA" sz="2800" b="0" i="1" smtClean="0">
+                                      <a:solidFill>
+                                        <a:schemeClr val="bg1"/>
+                                      </a:solidFill>
+                                      <a:latin typeface="Cambria Math" panose="02040503050406030204" pitchFamily="18" charset="0"/>
+                                    </a:rPr>
+                                  </m:ctrlPr>
+                                </m:accPr>
+                                <m:e>
+                                  <m:r>
+                                    <a:rPr lang="fr-CA" sz="2800" b="0" i="1" smtClean="0">
+                                      <a:solidFill>
+                                        <a:schemeClr val="bg1"/>
+                                      </a:solidFill>
+                                      <a:latin typeface="Cambria Math" panose="02040503050406030204" pitchFamily="18" charset="0"/>
+                                    </a:rPr>
+                                    <m:t>𝑛</m:t>
+                                  </m:r>
+                                </m:e>
+                              </m:acc>
+                            </m:e>
+                            <m:sub>
+                              <m:r>
+                                <a:rPr lang="fr-CA" sz="2800" b="0" i="1" smtClean="0">
+                                  <a:solidFill>
+                                    <a:schemeClr val="bg1"/>
+                                  </a:solidFill>
+                                  <a:latin typeface="Cambria Math" panose="02040503050406030204" pitchFamily="18" charset="0"/>
+                                </a:rPr>
+                                <m:t>4</m:t>
+                              </m:r>
+                            </m:sub>
+                          </m:sSub>
+                        </m:oMath>
+                      </m:oMathPara>
+                    </a14:m>
+                    <a:endParaRPr lang="en-CA" sz="2800" dirty="0">
+                      <a:solidFill>
+                        <a:schemeClr val="bg1"/>
+                      </a:solidFill>
+                    </a:endParaRPr>
+                  </a:p>
+                </p:txBody>
+              </p:sp>
+            </mc:Choice>
+            <mc:Fallback xmlns="">
+              <p:sp>
+                <p:nvSpPr>
+                  <p:cNvPr id="39" name="ZoneTexte 38">
+                    <a:extLst>
+                      <a:ext uri="{FF2B5EF4-FFF2-40B4-BE49-F238E27FC236}">
+                        <a16:creationId xmlns:a16="http://schemas.microsoft.com/office/drawing/2014/main" id="{E54DF084-0B81-B047-BC53-26CCD183350F}"/>
+                      </a:ext>
+                    </a:extLst>
+                  </p:cNvPr>
+                  <p:cNvSpPr txBox="1">
+                    <a:spLocks noRot="1" noChangeAspect="1" noMove="1" noResize="1" noEditPoints="1" noAdjustHandles="1" noChangeArrowheads="1" noChangeShapeType="1" noTextEdit="1"/>
+                  </p:cNvSpPr>
+                  <p:nvPr/>
+                </p:nvSpPr>
+                <p:spPr>
+                  <a:xfrm>
+                    <a:off x="4578228" y="563402"/>
+                    <a:ext cx="1107280" cy="523220"/>
+                  </a:xfrm>
+                  <a:prstGeom prst="rect">
+                    <a:avLst/>
+                  </a:prstGeom>
+                  <a:blipFill>
+                    <a:blip r:embed="rId4"/>
+                    <a:stretch>
+                      <a:fillRect/>
+                    </a:stretch>
+                  </a:blipFill>
+                </p:spPr>
+                <p:txBody>
+                  <a:bodyPr/>
+                  <a:lstStyle/>
+                  <a:p>
+                    <a:r>
+                      <a:rPr lang="fr-CA">
+                        <a:noFill/>
+                      </a:rPr>
+                      <a:t> </a:t>
+                    </a:r>
+                  </a:p>
+                </p:txBody>
+              </p:sp>
+            </mc:Fallback>
+          </mc:AlternateContent>
+          <p:sp>
+            <p:nvSpPr>
+              <p:cNvPr id="40" name="Ellipse 39">
+                <a:extLst>
+                  <a:ext uri="{FF2B5EF4-FFF2-40B4-BE49-F238E27FC236}">
+                    <a16:creationId xmlns:a16="http://schemas.microsoft.com/office/drawing/2014/main" id="{D91AF216-F953-E84C-A8C1-C750E6121663}"/>
+                  </a:ext>
+                </a:extLst>
+              </p:cNvPr>
+              <p:cNvSpPr/>
+              <p:nvPr/>
+            </p:nvSpPr>
+            <p:spPr>
+              <a:xfrm>
+                <a:off x="5306559" y="2297367"/>
+                <a:ext cx="697113" cy="590211"/>
+              </a:xfrm>
+              <a:prstGeom prst="ellipse">
+                <a:avLst/>
+              </a:prstGeom>
+              <a:solidFill>
+                <a:schemeClr val="tx1"/>
+              </a:solidFill>
+            </p:spPr>
+            <p:style>
+              <a:lnRef idx="2">
+                <a:schemeClr val="accent1">
+                  <a:shade val="50000"/>
+                </a:schemeClr>
+              </a:lnRef>
+              <a:fillRef idx="1">
+                <a:schemeClr val="accent1"/>
+              </a:fillRef>
+              <a:effectRef idx="0">
+                <a:schemeClr val="accent1"/>
+              </a:effectRef>
+              <a:fontRef idx="minor">
+                <a:schemeClr val="lt1"/>
+              </a:fontRef>
+            </p:style>
+            <p:txBody>
+              <a:bodyPr rtlCol="0" anchor="ctr"/>
+              <a:lstStyle/>
+              <a:p>
+                <a:pPr algn="ctr"/>
+                <a:r>
+                  <a:rPr lang="en-CA" sz="2400" dirty="0"/>
+                  <a:t>12</a:t>
+                </a:r>
+              </a:p>
+            </p:txBody>
+          </p:sp>
+          <p:sp>
+            <p:nvSpPr>
+              <p:cNvPr id="15" name="Ellipse 14">
+                <a:extLst>
+                  <a:ext uri="{FF2B5EF4-FFF2-40B4-BE49-F238E27FC236}">
+                    <a16:creationId xmlns:a16="http://schemas.microsoft.com/office/drawing/2014/main" id="{65B4D761-3140-9A41-8263-736BFFDA0133}"/>
+                  </a:ext>
+                </a:extLst>
+              </p:cNvPr>
+              <p:cNvSpPr/>
+              <p:nvPr/>
+            </p:nvSpPr>
+            <p:spPr>
+              <a:xfrm>
+                <a:off x="3563257" y="2301943"/>
+                <a:ext cx="697112" cy="590211"/>
+              </a:xfrm>
+              <a:prstGeom prst="ellipse">
+                <a:avLst/>
+              </a:prstGeom>
+              <a:solidFill>
+                <a:schemeClr val="tx1"/>
+              </a:solidFill>
+            </p:spPr>
+            <p:style>
+              <a:lnRef idx="2">
+                <a:schemeClr val="accent1">
+                  <a:shade val="50000"/>
+                </a:schemeClr>
+              </a:lnRef>
+              <a:fillRef idx="1">
+                <a:schemeClr val="accent1"/>
+              </a:fillRef>
+              <a:effectRef idx="0">
+                <a:schemeClr val="accent1"/>
+              </a:effectRef>
+              <a:fontRef idx="minor">
+                <a:schemeClr val="lt1"/>
+              </a:fontRef>
+            </p:style>
+            <p:txBody>
+              <a:bodyPr rtlCol="0" anchor="ctr"/>
+              <a:lstStyle/>
+              <a:p>
+                <a:pPr algn="ctr"/>
+                <a:r>
+                  <a:rPr lang="en-CA" sz="2400" dirty="0"/>
+                  <a:t>11</a:t>
+                </a:r>
+              </a:p>
+            </p:txBody>
+          </p:sp>
+          <p:sp>
+            <p:nvSpPr>
+              <p:cNvPr id="6" name="Rectangle 5">
+                <a:extLst>
+                  <a:ext uri="{FF2B5EF4-FFF2-40B4-BE49-F238E27FC236}">
+                    <a16:creationId xmlns:a16="http://schemas.microsoft.com/office/drawing/2014/main" id="{5F4034AC-020D-D346-82FB-C8E26EC44026}"/>
+                  </a:ext>
+                </a:extLst>
+              </p:cNvPr>
+              <p:cNvSpPr/>
+              <p:nvPr/>
+            </p:nvSpPr>
+            <p:spPr>
+              <a:xfrm>
+                <a:off x="3785178" y="2909558"/>
+                <a:ext cx="1983243" cy="434370"/>
+              </a:xfrm>
+              <a:prstGeom prst="rect">
+                <a:avLst/>
+              </a:prstGeom>
+              <a:noFill/>
+              <a:ln>
+                <a:noFill/>
+              </a:ln>
+            </p:spPr>
+            <p:style>
+              <a:lnRef idx="2">
+                <a:schemeClr val="accent1">
+                  <a:shade val="50000"/>
+                </a:schemeClr>
+              </a:lnRef>
+              <a:fillRef idx="1">
+                <a:schemeClr val="accent1"/>
+              </a:fillRef>
+              <a:effectRef idx="0">
+                <a:schemeClr val="accent1"/>
+              </a:effectRef>
+              <a:fontRef idx="minor">
+                <a:schemeClr val="lt1"/>
+              </a:fontRef>
+            </p:style>
+            <p:txBody>
+              <a:bodyPr rtlCol="0" anchor="ctr"/>
+              <a:lstStyle/>
+              <a:p>
+                <a:pPr algn="ctr"/>
+                <a:r>
+                  <a:rPr lang="en-CA" sz="4000" dirty="0" err="1"/>
+                  <a:t>Bois</a:t>
+                </a:r>
+                <a:r>
+                  <a:rPr lang="en-CA" sz="4000" dirty="0"/>
+                  <a:t> (2) </a:t>
+                </a:r>
+              </a:p>
+            </p:txBody>
+          </p:sp>
+          <p:sp>
+            <p:nvSpPr>
+              <p:cNvPr id="36" name="Ellipse 35">
+                <a:extLst>
+                  <a:ext uri="{FF2B5EF4-FFF2-40B4-BE49-F238E27FC236}">
+                    <a16:creationId xmlns:a16="http://schemas.microsoft.com/office/drawing/2014/main" id="{E0D0036F-C871-534D-9340-43B4BCA343B6}"/>
+                  </a:ext>
+                </a:extLst>
+              </p:cNvPr>
+              <p:cNvSpPr/>
+              <p:nvPr/>
+            </p:nvSpPr>
+            <p:spPr>
+              <a:xfrm>
+                <a:off x="4427183" y="1284364"/>
+                <a:ext cx="679714" cy="560436"/>
+              </a:xfrm>
+              <a:prstGeom prst="ellipse">
+                <a:avLst/>
+              </a:prstGeom>
+              <a:solidFill>
+                <a:schemeClr val="tx1"/>
+              </a:solidFill>
+            </p:spPr>
+            <p:style>
+              <a:lnRef idx="2">
+                <a:schemeClr val="accent1">
+                  <a:shade val="50000"/>
+                </a:schemeClr>
+              </a:lnRef>
+              <a:fillRef idx="1">
+                <a:schemeClr val="accent1"/>
+              </a:fillRef>
+              <a:effectRef idx="0">
+                <a:schemeClr val="accent1"/>
+              </a:effectRef>
+              <a:fontRef idx="minor">
+                <a:schemeClr val="lt1"/>
+              </a:fontRef>
+            </p:style>
+            <p:txBody>
+              <a:bodyPr rtlCol="0" anchor="ctr"/>
+              <a:lstStyle/>
+              <a:p>
+                <a:pPr algn="ctr"/>
+                <a:r>
+                  <a:rPr lang="en-CA" sz="2400" dirty="0"/>
+                  <a:t>4</a:t>
+                </a:r>
+              </a:p>
+            </p:txBody>
+          </p:sp>
+        </p:grpSp>
         <p:sp>
           <p:nvSpPr>
-            <p:cNvPr id="4" name="Rectangle 3">
+            <p:cNvPr id="2" name="Arc 1">
               <a:extLst>
                 <a:ext uri="{FF2B5EF4-FFF2-40B4-BE49-F238E27FC236}">
-                  <a16:creationId xmlns:a16="http://schemas.microsoft.com/office/drawing/2014/main" id="{4A62991C-3002-B141-BAD5-7467C3630633}"/>
+                  <a16:creationId xmlns:a16="http://schemas.microsoft.com/office/drawing/2014/main" id="{DC47016A-1F79-4515-B7A4-0DCAE5479FC5}"/>
                 </a:ext>
               </a:extLst>
             </p:cNvPr>
@@ -19949,27 +21006,28 @@
           </p:nvSpPr>
           <p:spPr>
             <a:xfrm>
-              <a:off x="1482571" y="159797"/>
-              <a:ext cx="6098959" cy="4134367"/>
+              <a:off x="3063714" y="1450519"/>
+              <a:ext cx="679714" cy="633458"/>
             </a:xfrm>
-            <a:prstGeom prst="rect">
-              <a:avLst/>
+            <a:prstGeom prst="arc">
+              <a:avLst>
+                <a:gd name="adj1" fmla="val 1471116"/>
+                <a:gd name="adj2" fmla="val 9318094"/>
+              </a:avLst>
             </a:prstGeom>
           </p:spPr>
           <p:style>
-            <a:lnRef idx="2">
-              <a:schemeClr val="accent1">
-                <a:shade val="50000"/>
-              </a:schemeClr>
+            <a:lnRef idx="3">
+              <a:schemeClr val="dk1"/>
             </a:lnRef>
-            <a:fillRef idx="1">
-              <a:schemeClr val="accent1"/>
+            <a:fillRef idx="0">
+              <a:schemeClr val="dk1"/>
             </a:fillRef>
-            <a:effectRef idx="0">
-              <a:schemeClr val="accent1"/>
+            <a:effectRef idx="2">
+              <a:schemeClr val="dk1"/>
             </a:effectRef>
             <a:fontRef idx="minor">
-              <a:schemeClr val="lt1"/>
+              <a:schemeClr val="tx1"/>
             </a:fontRef>
           </p:style>
           <p:txBody>
@@ -19977,198 +21035,16 @@
             <a:lstStyle/>
             <a:p>
               <a:pPr algn="ctr"/>
-              <a:endParaRPr lang="en-CA" sz="2400" dirty="0"/>
+              <a:endParaRPr lang="fr-CA"/>
             </a:p>
           </p:txBody>
         </p:sp>
-        <p:cxnSp>
-          <p:nvCxnSpPr>
-            <p:cNvPr id="19" name="Connecteur droit avec flèche 18">
+        <p:sp>
+          <p:nvSpPr>
+            <p:cNvPr id="3" name="ZoneTexte 2">
               <a:extLst>
                 <a:ext uri="{FF2B5EF4-FFF2-40B4-BE49-F238E27FC236}">
-                  <a16:creationId xmlns:a16="http://schemas.microsoft.com/office/drawing/2014/main" id="{0230423D-46B4-6D4F-8282-94E72682E252}"/>
-                </a:ext>
-              </a:extLst>
-            </p:cNvPr>
-            <p:cNvCxnSpPr>
-              <a:cxnSpLocks/>
-            </p:cNvCxnSpPr>
-            <p:nvPr/>
-          </p:nvCxnSpPr>
-          <p:spPr>
-            <a:xfrm flipV="1">
-              <a:off x="5655116" y="2095130"/>
-              <a:ext cx="645614" cy="503231"/>
-            </a:xfrm>
-            <a:prstGeom prst="straightConnector1">
-              <a:avLst/>
-            </a:prstGeom>
-            <a:ln w="38100">
-              <a:solidFill>
-                <a:schemeClr val="bg1"/>
-              </a:solidFill>
-              <a:tailEnd type="triangle"/>
-            </a:ln>
-          </p:spPr>
-          <p:style>
-            <a:lnRef idx="1">
-              <a:schemeClr val="accent1"/>
-            </a:lnRef>
-            <a:fillRef idx="0">
-              <a:schemeClr val="accent1"/>
-            </a:fillRef>
-            <a:effectRef idx="0">
-              <a:schemeClr val="accent1"/>
-            </a:effectRef>
-            <a:fontRef idx="minor">
-              <a:schemeClr val="tx1"/>
-            </a:fontRef>
-          </p:style>
-        </p:cxnSp>
-        <p:cxnSp>
-          <p:nvCxnSpPr>
-            <p:cNvPr id="21" name="Connecteur droit avec flèche 20">
-              <a:extLst>
-                <a:ext uri="{FF2B5EF4-FFF2-40B4-BE49-F238E27FC236}">
-                  <a16:creationId xmlns:a16="http://schemas.microsoft.com/office/drawing/2014/main" id="{711D3344-F70F-BC46-9A07-168C12F25AC6}"/>
-                </a:ext>
-              </a:extLst>
-            </p:cNvPr>
-            <p:cNvCxnSpPr>
-              <a:cxnSpLocks/>
-            </p:cNvCxnSpPr>
-            <p:nvPr/>
-          </p:nvCxnSpPr>
-          <p:spPr>
-            <a:xfrm flipH="1" flipV="1">
-              <a:off x="3210408" y="1999413"/>
-              <a:ext cx="679187" cy="595908"/>
-            </a:xfrm>
-            <a:prstGeom prst="straightConnector1">
-              <a:avLst/>
-            </a:prstGeom>
-            <a:ln w="38100">
-              <a:solidFill>
-                <a:schemeClr val="bg1"/>
-              </a:solidFill>
-              <a:tailEnd type="triangle"/>
-            </a:ln>
-          </p:spPr>
-          <p:style>
-            <a:lnRef idx="1">
-              <a:schemeClr val="accent1"/>
-            </a:lnRef>
-            <a:fillRef idx="0">
-              <a:schemeClr val="accent1"/>
-            </a:fillRef>
-            <a:effectRef idx="0">
-              <a:schemeClr val="accent1"/>
-            </a:effectRef>
-            <a:fontRef idx="minor">
-              <a:schemeClr val="tx1"/>
-            </a:fontRef>
-          </p:style>
-        </p:cxnSp>
-        <p:cxnSp>
-          <p:nvCxnSpPr>
-            <p:cNvPr id="24" name="Connecteur droit avec flèche 23">
-              <a:extLst>
-                <a:ext uri="{FF2B5EF4-FFF2-40B4-BE49-F238E27FC236}">
-                  <a16:creationId xmlns:a16="http://schemas.microsoft.com/office/drawing/2014/main" id="{6D4AD4DF-451A-EE4B-9348-45AEFFB6138E}"/>
-                </a:ext>
-              </a:extLst>
-            </p:cNvPr>
-            <p:cNvCxnSpPr>
-              <a:cxnSpLocks/>
-            </p:cNvCxnSpPr>
-            <p:nvPr/>
-          </p:nvCxnSpPr>
-          <p:spPr>
-            <a:xfrm>
-              <a:off x="1909927" y="585388"/>
-              <a:ext cx="1150030" cy="0"/>
-            </a:xfrm>
-            <a:prstGeom prst="straightConnector1">
-              <a:avLst/>
-            </a:prstGeom>
-            <a:ln w="76200">
-              <a:solidFill>
-                <a:schemeClr val="tx1">
-                  <a:lumMod val="95000"/>
-                  <a:lumOff val="5000"/>
-                </a:schemeClr>
-              </a:solidFill>
-              <a:tailEnd type="triangle"/>
-            </a:ln>
-          </p:spPr>
-          <p:style>
-            <a:lnRef idx="1">
-              <a:schemeClr val="accent1"/>
-            </a:lnRef>
-            <a:fillRef idx="0">
-              <a:schemeClr val="accent1"/>
-            </a:fillRef>
-            <a:effectRef idx="0">
-              <a:schemeClr val="accent1"/>
-            </a:effectRef>
-            <a:fontRef idx="minor">
-              <a:schemeClr val="tx1"/>
-            </a:fontRef>
-          </p:style>
-        </p:cxnSp>
-        <p:cxnSp>
-          <p:nvCxnSpPr>
-            <p:cNvPr id="25" name="Connecteur droit avec flèche 24">
-              <a:extLst>
-                <a:ext uri="{FF2B5EF4-FFF2-40B4-BE49-F238E27FC236}">
-                  <a16:creationId xmlns:a16="http://schemas.microsoft.com/office/drawing/2014/main" id="{6FFF3D04-1153-3A40-AFAC-9BBBEE93268D}"/>
-                </a:ext>
-              </a:extLst>
-            </p:cNvPr>
-            <p:cNvCxnSpPr>
-              <a:cxnSpLocks/>
-            </p:cNvCxnSpPr>
-            <p:nvPr/>
-          </p:nvCxnSpPr>
-          <p:spPr>
-            <a:xfrm>
-              <a:off x="1942585" y="585388"/>
-              <a:ext cx="0" cy="1156946"/>
-            </a:xfrm>
-            <a:prstGeom prst="straightConnector1">
-              <a:avLst/>
-            </a:prstGeom>
-            <a:ln w="76200">
-              <a:solidFill>
-                <a:schemeClr val="tx1">
-                  <a:lumMod val="95000"/>
-                  <a:lumOff val="5000"/>
-                </a:schemeClr>
-              </a:solidFill>
-              <a:tailEnd type="triangle"/>
-            </a:ln>
-          </p:spPr>
-          <p:style>
-            <a:lnRef idx="1">
-              <a:schemeClr val="accent1"/>
-            </a:lnRef>
-            <a:fillRef idx="0">
-              <a:schemeClr val="accent1"/>
-            </a:fillRef>
-            <a:effectRef idx="0">
-              <a:schemeClr val="accent1"/>
-            </a:effectRef>
-            <a:fontRef idx="minor">
-              <a:schemeClr val="tx1"/>
-            </a:fontRef>
-          </p:style>
-        </p:cxnSp>
-        <p:sp>
-          <p:nvSpPr>
-            <p:cNvPr id="26" name="ZoneTexte 25">
-              <a:extLst>
-                <a:ext uri="{FF2B5EF4-FFF2-40B4-BE49-F238E27FC236}">
-                  <a16:creationId xmlns:a16="http://schemas.microsoft.com/office/drawing/2014/main" id="{C450F287-C5CF-5547-AFE4-22C8D92AE2F7}"/>
+                  <a16:creationId xmlns:a16="http://schemas.microsoft.com/office/drawing/2014/main" id="{8C4AC28B-E18A-4E48-A5C8-73636B17DF9E}"/>
                 </a:ext>
               </a:extLst>
             </p:cNvPr>
@@ -20177,8 +21053,8 @@
           </p:nvSpPr>
           <p:spPr>
             <a:xfrm>
-              <a:off x="3182732" y="465393"/>
-              <a:ext cx="533400" cy="646331"/>
+              <a:off x="3240408" y="2051160"/>
+              <a:ext cx="378630" cy="461665"/>
             </a:xfrm>
             <a:prstGeom prst="rect">
               <a:avLst/>
@@ -20186,807 +21062,28 @@
             <a:noFill/>
           </p:spPr>
           <p:txBody>
-            <a:bodyPr wrap="square" rtlCol="0">
+            <a:bodyPr wrap="none" rtlCol="0">
               <a:spAutoFit/>
             </a:bodyPr>
             <a:lstStyle/>
             <a:p>
               <a:r>
-                <a:rPr lang="en-CA" sz="3600" dirty="0"/>
-                <a:t>x</a:t>
+                <a:rPr lang="fr-CA" sz="2400" dirty="0">
+                  <a:sym typeface="Symbol" panose="05050102010706020507" pitchFamily="18" charset="2"/>
+                </a:rPr>
+                <a:t></a:t>
               </a:r>
-            </a:p>
-          </p:txBody>
-        </p:sp>
-        <p:sp>
-          <p:nvSpPr>
-            <p:cNvPr id="27" name="ZoneTexte 26">
-              <a:extLst>
-                <a:ext uri="{FF2B5EF4-FFF2-40B4-BE49-F238E27FC236}">
-                  <a16:creationId xmlns:a16="http://schemas.microsoft.com/office/drawing/2014/main" id="{C72250FA-04FC-2243-A1DE-824616E3DD78}"/>
-                </a:ext>
-              </a:extLst>
-            </p:cNvPr>
-            <p:cNvSpPr txBox="1"/>
-            <p:nvPr/>
-          </p:nvSpPr>
-          <p:spPr>
-            <a:xfrm>
-              <a:off x="1906072" y="1692250"/>
-              <a:ext cx="533400" cy="584775"/>
-            </a:xfrm>
-            <a:prstGeom prst="rect">
-              <a:avLst/>
-            </a:prstGeom>
-            <a:noFill/>
-          </p:spPr>
-          <p:txBody>
-            <a:bodyPr wrap="square" rtlCol="0">
-              <a:spAutoFit/>
-            </a:bodyPr>
-            <a:lstStyle/>
-            <a:p>
-              <a:r>
-                <a:rPr lang="en-CA" sz="3200" dirty="0"/>
-                <a:t>y</a:t>
-              </a:r>
-            </a:p>
-          </p:txBody>
-        </p:sp>
-        <mc:AlternateContent xmlns:mc="http://schemas.openxmlformats.org/markup-compatibility/2006">
-          <mc:Choice xmlns:a14="http://schemas.microsoft.com/office/drawing/2010/main" Requires="a14">
-            <p:sp>
-              <p:nvSpPr>
-                <p:cNvPr id="28" name="ZoneTexte 27">
-                  <a:extLst>
-                    <a:ext uri="{FF2B5EF4-FFF2-40B4-BE49-F238E27FC236}">
-                      <a16:creationId xmlns:a16="http://schemas.microsoft.com/office/drawing/2014/main" id="{B14F0718-5DAE-874E-B1BC-14AB5CD09A31}"/>
-                    </a:ext>
-                  </a:extLst>
-                </p:cNvPr>
-                <p:cNvSpPr txBox="1"/>
-                <p:nvPr/>
-              </p:nvSpPr>
-              <p:spPr>
-                <a:xfrm>
-                  <a:off x="5926374" y="1578602"/>
-                  <a:ext cx="1107280" cy="523220"/>
-                </a:xfrm>
-                <a:prstGeom prst="rect">
-                  <a:avLst/>
-                </a:prstGeom>
-                <a:noFill/>
-              </p:spPr>
-              <p:txBody>
-                <a:bodyPr wrap="square" rtlCol="0">
-                  <a:spAutoFit/>
-                </a:bodyPr>
-                <a:lstStyle/>
-                <a:p>
-                  <a:pPr/>
-                  <a14:m>
-                    <m:oMathPara xmlns:m="http://schemas.openxmlformats.org/officeDocument/2006/math">
-                      <m:oMathParaPr>
-                        <m:jc m:val="centerGroup"/>
-                      </m:oMathParaPr>
-                      <m:oMath xmlns:m="http://schemas.openxmlformats.org/officeDocument/2006/math">
-                        <m:sSub>
-                          <m:sSubPr>
-                            <m:ctrlPr>
-                              <a:rPr lang="fr-CA" sz="2800" b="0" i="1" smtClean="0">
-                                <a:solidFill>
-                                  <a:schemeClr val="bg1"/>
-                                </a:solidFill>
-                                <a:latin typeface="Cambria Math" panose="02040503050406030204" pitchFamily="18" charset="0"/>
-                              </a:rPr>
-                            </m:ctrlPr>
-                          </m:sSubPr>
-                          <m:e>
-                            <m:acc>
-                              <m:accPr>
-                                <m:chr m:val="̂"/>
-                                <m:ctrlPr>
-                                  <a:rPr lang="fr-CA" sz="2800" b="0" i="1" smtClean="0">
-                                    <a:solidFill>
-                                      <a:schemeClr val="bg1"/>
-                                    </a:solidFill>
-                                    <a:latin typeface="Cambria Math" panose="02040503050406030204" pitchFamily="18" charset="0"/>
-                                  </a:rPr>
-                                </m:ctrlPr>
-                              </m:accPr>
-                              <m:e>
-                                <m:r>
-                                  <a:rPr lang="fr-CA" sz="2800" b="0" i="1" smtClean="0">
-                                    <a:solidFill>
-                                      <a:schemeClr val="bg1"/>
-                                    </a:solidFill>
-                                    <a:latin typeface="Cambria Math" panose="02040503050406030204" pitchFamily="18" charset="0"/>
-                                  </a:rPr>
-                                  <m:t>𝑛</m:t>
-                                </m:r>
-                              </m:e>
-                            </m:acc>
-                          </m:e>
-                          <m:sub>
-                            <m:r>
-                              <a:rPr lang="fr-CA" sz="2800" b="0" i="1" smtClean="0">
-                                <a:solidFill>
-                                  <a:schemeClr val="bg1"/>
-                                </a:solidFill>
-                                <a:latin typeface="Cambria Math" panose="02040503050406030204" pitchFamily="18" charset="0"/>
-                              </a:rPr>
-                              <m:t>1</m:t>
-                            </m:r>
-                            <m:r>
-                              <a:rPr lang="fr-CA" sz="2800" b="0" i="1" smtClean="0">
-                                <a:solidFill>
-                                  <a:schemeClr val="bg1"/>
-                                </a:solidFill>
-                                <a:latin typeface="Cambria Math" panose="02040503050406030204" pitchFamily="18" charset="0"/>
-                              </a:rPr>
-                              <m:t>2</m:t>
-                            </m:r>
-                          </m:sub>
-                        </m:sSub>
-                      </m:oMath>
-                    </m:oMathPara>
-                  </a14:m>
-                  <a:endParaRPr lang="en-CA" sz="2800" dirty="0">
-                    <a:solidFill>
-                      <a:schemeClr val="bg1"/>
-                    </a:solidFill>
-                  </a:endParaRPr>
-                </a:p>
-              </p:txBody>
-            </p:sp>
-          </mc:Choice>
-          <mc:Fallback>
-            <p:sp>
-              <p:nvSpPr>
-                <p:cNvPr id="28" name="ZoneTexte 27">
-                  <a:extLst>
-                    <a:ext uri="{FF2B5EF4-FFF2-40B4-BE49-F238E27FC236}">
-                      <a16:creationId xmlns:a16="http://schemas.microsoft.com/office/drawing/2014/main" id="{B14F0718-5DAE-874E-B1BC-14AB5CD09A31}"/>
-                    </a:ext>
-                  </a:extLst>
-                </p:cNvPr>
-                <p:cNvSpPr txBox="1">
-                  <a:spLocks noRot="1" noChangeAspect="1" noMove="1" noResize="1" noEditPoints="1" noAdjustHandles="1" noChangeArrowheads="1" noChangeShapeType="1" noTextEdit="1"/>
-                </p:cNvSpPr>
-                <p:nvPr/>
-              </p:nvSpPr>
-              <p:spPr>
-                <a:xfrm>
-                  <a:off x="5926374" y="1578602"/>
-                  <a:ext cx="1107280" cy="523220"/>
-                </a:xfrm>
-                <a:prstGeom prst="rect">
-                  <a:avLst/>
-                </a:prstGeom>
-                <a:blipFill>
-                  <a:blip r:embed="rId2"/>
-                  <a:stretch>
-                    <a:fillRect/>
-                  </a:stretch>
-                </a:blipFill>
-              </p:spPr>
-              <p:txBody>
-                <a:bodyPr/>
-                <a:lstStyle/>
-                <a:p>
-                  <a:r>
-                    <a:rPr lang="fr-CA">
-                      <a:noFill/>
-                    </a:rPr>
-                    <a:t> </a:t>
-                  </a:r>
-                </a:p>
-              </p:txBody>
-            </p:sp>
-          </mc:Fallback>
-        </mc:AlternateContent>
-        <mc:AlternateContent xmlns:mc="http://schemas.openxmlformats.org/markup-compatibility/2006">
-          <mc:Choice xmlns:a14="http://schemas.microsoft.com/office/drawing/2010/main" Requires="a14">
-            <p:sp>
-              <p:nvSpPr>
-                <p:cNvPr id="31" name="ZoneTexte 30">
-                  <a:extLst>
-                    <a:ext uri="{FF2B5EF4-FFF2-40B4-BE49-F238E27FC236}">
-                      <a16:creationId xmlns:a16="http://schemas.microsoft.com/office/drawing/2014/main" id="{744B4C27-6A60-CB4B-B4A5-706004BD43A4}"/>
-                    </a:ext>
-                  </a:extLst>
-                </p:cNvPr>
-                <p:cNvSpPr txBox="1"/>
-                <p:nvPr/>
-              </p:nvSpPr>
-              <p:spPr>
-                <a:xfrm>
-                  <a:off x="2858946" y="1464486"/>
-                  <a:ext cx="1107280" cy="523220"/>
-                </a:xfrm>
-                <a:prstGeom prst="rect">
-                  <a:avLst/>
-                </a:prstGeom>
-                <a:noFill/>
-              </p:spPr>
-              <p:txBody>
-                <a:bodyPr wrap="square" rtlCol="0">
-                  <a:spAutoFit/>
-                </a:bodyPr>
-                <a:lstStyle/>
-                <a:p>
-                  <a:pPr/>
-                  <a14:m>
-                    <m:oMathPara xmlns:m="http://schemas.openxmlformats.org/officeDocument/2006/math">
-                      <m:oMathParaPr>
-                        <m:jc m:val="centerGroup"/>
-                      </m:oMathParaPr>
-                      <m:oMath xmlns:m="http://schemas.openxmlformats.org/officeDocument/2006/math">
-                        <m:sSub>
-                          <m:sSubPr>
-                            <m:ctrlPr>
-                              <a:rPr lang="fr-CA" sz="2800" b="0" i="1" smtClean="0">
-                                <a:solidFill>
-                                  <a:schemeClr val="bg1"/>
-                                </a:solidFill>
-                                <a:latin typeface="Cambria Math" panose="02040503050406030204" pitchFamily="18" charset="0"/>
-                              </a:rPr>
-                            </m:ctrlPr>
-                          </m:sSubPr>
-                          <m:e>
-                            <m:acc>
-                              <m:accPr>
-                                <m:chr m:val="̂"/>
-                                <m:ctrlPr>
-                                  <a:rPr lang="fr-CA" sz="2800" b="0" i="1" smtClean="0">
-                                    <a:solidFill>
-                                      <a:schemeClr val="bg1"/>
-                                    </a:solidFill>
-                                    <a:latin typeface="Cambria Math" panose="02040503050406030204" pitchFamily="18" charset="0"/>
-                                  </a:rPr>
-                                </m:ctrlPr>
-                              </m:accPr>
-                              <m:e>
-                                <m:r>
-                                  <a:rPr lang="fr-CA" sz="2800" b="0" i="1" smtClean="0">
-                                    <a:solidFill>
-                                      <a:schemeClr val="bg1"/>
-                                    </a:solidFill>
-                                    <a:latin typeface="Cambria Math" panose="02040503050406030204" pitchFamily="18" charset="0"/>
-                                  </a:rPr>
-                                  <m:t>𝑛</m:t>
-                                </m:r>
-                              </m:e>
-                            </m:acc>
-                          </m:e>
-                          <m:sub>
-                            <m:r>
-                              <a:rPr lang="fr-CA" sz="2800" b="0" i="1" smtClean="0">
-                                <a:solidFill>
-                                  <a:schemeClr val="bg1"/>
-                                </a:solidFill>
-                                <a:latin typeface="Cambria Math" panose="02040503050406030204" pitchFamily="18" charset="0"/>
-                              </a:rPr>
-                              <m:t>11</m:t>
-                            </m:r>
-                          </m:sub>
-                        </m:sSub>
-                      </m:oMath>
-                    </m:oMathPara>
-                  </a14:m>
-                  <a:endParaRPr lang="en-CA" sz="2800" dirty="0">
-                    <a:solidFill>
-                      <a:schemeClr val="bg1"/>
-                    </a:solidFill>
-                  </a:endParaRPr>
-                </a:p>
-              </p:txBody>
-            </p:sp>
-          </mc:Choice>
-          <mc:Fallback>
-            <p:sp>
-              <p:nvSpPr>
-                <p:cNvPr id="31" name="ZoneTexte 30">
-                  <a:extLst>
-                    <a:ext uri="{FF2B5EF4-FFF2-40B4-BE49-F238E27FC236}">
-                      <a16:creationId xmlns:a16="http://schemas.microsoft.com/office/drawing/2014/main" id="{744B4C27-6A60-CB4B-B4A5-706004BD43A4}"/>
-                    </a:ext>
-                  </a:extLst>
-                </p:cNvPr>
-                <p:cNvSpPr txBox="1">
-                  <a:spLocks noRot="1" noChangeAspect="1" noMove="1" noResize="1" noEditPoints="1" noAdjustHandles="1" noChangeArrowheads="1" noChangeShapeType="1" noTextEdit="1"/>
-                </p:cNvSpPr>
-                <p:nvPr/>
-              </p:nvSpPr>
-              <p:spPr>
-                <a:xfrm>
-                  <a:off x="2858946" y="1464486"/>
-                  <a:ext cx="1107280" cy="523220"/>
-                </a:xfrm>
-                <a:prstGeom prst="rect">
-                  <a:avLst/>
-                </a:prstGeom>
-                <a:blipFill>
-                  <a:blip r:embed="rId3"/>
-                  <a:stretch>
-                    <a:fillRect/>
-                  </a:stretch>
-                </a:blipFill>
-              </p:spPr>
-              <p:txBody>
-                <a:bodyPr/>
-                <a:lstStyle/>
-                <a:p>
-                  <a:r>
-                    <a:rPr lang="fr-CA">
-                      <a:noFill/>
-                    </a:rPr>
-                    <a:t> </a:t>
-                  </a:r>
-                </a:p>
-              </p:txBody>
-            </p:sp>
-          </mc:Fallback>
-        </mc:AlternateContent>
-        <p:sp>
-          <p:nvSpPr>
-            <p:cNvPr id="35" name="Triangle 34">
-              <a:extLst>
-                <a:ext uri="{FF2B5EF4-FFF2-40B4-BE49-F238E27FC236}">
-                  <a16:creationId xmlns:a16="http://schemas.microsoft.com/office/drawing/2014/main" id="{11D2922A-8024-CB44-ABC6-78A4B9486E7C}"/>
-                </a:ext>
-              </a:extLst>
-            </p:cNvPr>
-            <p:cNvSpPr/>
-            <p:nvPr/>
-          </p:nvSpPr>
-          <p:spPr>
-            <a:xfrm>
-              <a:off x="3060869" y="1517922"/>
-              <a:ext cx="3431863" cy="1989267"/>
-            </a:xfrm>
-            <a:prstGeom prst="triangle">
-              <a:avLst/>
-            </a:prstGeom>
-            <a:solidFill>
-              <a:schemeClr val="accent2"/>
-            </a:solidFill>
-            <a:ln>
-              <a:noFill/>
-            </a:ln>
-          </p:spPr>
-          <p:style>
-            <a:lnRef idx="2">
-              <a:schemeClr val="accent1">
-                <a:shade val="50000"/>
-              </a:schemeClr>
-            </a:lnRef>
-            <a:fillRef idx="1">
-              <a:schemeClr val="accent1"/>
-            </a:fillRef>
-            <a:effectRef idx="0">
-              <a:schemeClr val="accent1"/>
-            </a:effectRef>
-            <a:fontRef idx="minor">
-              <a:schemeClr val="lt1"/>
-            </a:fontRef>
-          </p:style>
-          <p:txBody>
-            <a:bodyPr rtlCol="0" anchor="ctr"/>
-            <a:lstStyle/>
-            <a:p>
-              <a:pPr algn="ctr"/>
-              <a:endParaRPr lang="en-CA"/>
-            </a:p>
-          </p:txBody>
-        </p:sp>
-        <p:cxnSp>
-          <p:nvCxnSpPr>
-            <p:cNvPr id="37" name="Connecteur droit avec flèche 36">
-              <a:extLst>
-                <a:ext uri="{FF2B5EF4-FFF2-40B4-BE49-F238E27FC236}">
-                  <a16:creationId xmlns:a16="http://schemas.microsoft.com/office/drawing/2014/main" id="{B744E7BE-6AEA-5A4E-8E98-5545FBB1749A}"/>
-                </a:ext>
-              </a:extLst>
-            </p:cNvPr>
-            <p:cNvCxnSpPr>
-              <a:cxnSpLocks/>
-            </p:cNvCxnSpPr>
-            <p:nvPr/>
-          </p:nvCxnSpPr>
-          <p:spPr>
-            <a:xfrm flipV="1">
-              <a:off x="4769616" y="825792"/>
-              <a:ext cx="0" cy="504656"/>
-            </a:xfrm>
-            <a:prstGeom prst="straightConnector1">
-              <a:avLst/>
-            </a:prstGeom>
-            <a:ln w="38100">
-              <a:solidFill>
-                <a:schemeClr val="bg1"/>
-              </a:solidFill>
-              <a:tailEnd type="triangle"/>
-            </a:ln>
-          </p:spPr>
-          <p:style>
-            <a:lnRef idx="1">
-              <a:schemeClr val="accent1"/>
-            </a:lnRef>
-            <a:fillRef idx="0">
-              <a:schemeClr val="accent1"/>
-            </a:fillRef>
-            <a:effectRef idx="0">
-              <a:schemeClr val="accent1"/>
-            </a:effectRef>
-            <a:fontRef idx="minor">
-              <a:schemeClr val="tx1"/>
-            </a:fontRef>
-          </p:style>
-        </p:cxnSp>
-        <mc:AlternateContent xmlns:mc="http://schemas.openxmlformats.org/markup-compatibility/2006">
-          <mc:Choice xmlns:a14="http://schemas.microsoft.com/office/drawing/2010/main" Requires="a14">
-            <p:sp>
-              <p:nvSpPr>
-                <p:cNvPr id="39" name="ZoneTexte 38">
-                  <a:extLst>
-                    <a:ext uri="{FF2B5EF4-FFF2-40B4-BE49-F238E27FC236}">
-                      <a16:creationId xmlns:a16="http://schemas.microsoft.com/office/drawing/2014/main" id="{E54DF084-0B81-B047-BC53-26CCD183350F}"/>
-                    </a:ext>
-                  </a:extLst>
-                </p:cNvPr>
-                <p:cNvSpPr txBox="1"/>
-                <p:nvPr/>
-              </p:nvSpPr>
-              <p:spPr>
-                <a:xfrm>
-                  <a:off x="4578228" y="563402"/>
-                  <a:ext cx="1107280" cy="523220"/>
-                </a:xfrm>
-                <a:prstGeom prst="rect">
-                  <a:avLst/>
-                </a:prstGeom>
-                <a:noFill/>
-              </p:spPr>
-              <p:txBody>
-                <a:bodyPr wrap="square" rtlCol="0">
-                  <a:spAutoFit/>
-                </a:bodyPr>
-                <a:lstStyle/>
-                <a:p>
-                  <a:pPr/>
-                  <a14:m>
-                    <m:oMathPara xmlns:m="http://schemas.openxmlformats.org/officeDocument/2006/math">
-                      <m:oMathParaPr>
-                        <m:jc m:val="centerGroup"/>
-                      </m:oMathParaPr>
-                      <m:oMath xmlns:m="http://schemas.openxmlformats.org/officeDocument/2006/math">
-                        <m:sSub>
-                          <m:sSubPr>
-                            <m:ctrlPr>
-                              <a:rPr lang="fr-CA" sz="2800" b="0" i="1" smtClean="0">
-                                <a:solidFill>
-                                  <a:schemeClr val="bg1"/>
-                                </a:solidFill>
-                                <a:latin typeface="Cambria Math" panose="02040503050406030204" pitchFamily="18" charset="0"/>
-                              </a:rPr>
-                            </m:ctrlPr>
-                          </m:sSubPr>
-                          <m:e>
-                            <m:acc>
-                              <m:accPr>
-                                <m:chr m:val="̂"/>
-                                <m:ctrlPr>
-                                  <a:rPr lang="fr-CA" sz="2800" b="0" i="1" smtClean="0">
-                                    <a:solidFill>
-                                      <a:schemeClr val="bg1"/>
-                                    </a:solidFill>
-                                    <a:latin typeface="Cambria Math" panose="02040503050406030204" pitchFamily="18" charset="0"/>
-                                  </a:rPr>
-                                </m:ctrlPr>
-                              </m:accPr>
-                              <m:e>
-                                <m:r>
-                                  <a:rPr lang="fr-CA" sz="2800" b="0" i="1" smtClean="0">
-                                    <a:solidFill>
-                                      <a:schemeClr val="bg1"/>
-                                    </a:solidFill>
-                                    <a:latin typeface="Cambria Math" panose="02040503050406030204" pitchFamily="18" charset="0"/>
-                                  </a:rPr>
-                                  <m:t>𝑛</m:t>
-                                </m:r>
-                              </m:e>
-                            </m:acc>
-                          </m:e>
-                          <m:sub>
-                            <m:r>
-                              <a:rPr lang="fr-CA" sz="2800" b="0" i="1" smtClean="0">
-                                <a:solidFill>
-                                  <a:schemeClr val="bg1"/>
-                                </a:solidFill>
-                                <a:latin typeface="Cambria Math" panose="02040503050406030204" pitchFamily="18" charset="0"/>
-                              </a:rPr>
-                              <m:t>4</m:t>
-                            </m:r>
-                          </m:sub>
-                        </m:sSub>
-                      </m:oMath>
-                    </m:oMathPara>
-                  </a14:m>
-                  <a:endParaRPr lang="en-CA" sz="2800" dirty="0">
-                    <a:solidFill>
-                      <a:schemeClr val="bg1"/>
-                    </a:solidFill>
-                  </a:endParaRPr>
-                </a:p>
-              </p:txBody>
-            </p:sp>
-          </mc:Choice>
-          <mc:Fallback>
-            <p:sp>
-              <p:nvSpPr>
-                <p:cNvPr id="39" name="ZoneTexte 38">
-                  <a:extLst>
-                    <a:ext uri="{FF2B5EF4-FFF2-40B4-BE49-F238E27FC236}">
-                      <a16:creationId xmlns:a16="http://schemas.microsoft.com/office/drawing/2014/main" id="{E54DF084-0B81-B047-BC53-26CCD183350F}"/>
-                    </a:ext>
-                  </a:extLst>
-                </p:cNvPr>
-                <p:cNvSpPr txBox="1">
-                  <a:spLocks noRot="1" noChangeAspect="1" noMove="1" noResize="1" noEditPoints="1" noAdjustHandles="1" noChangeArrowheads="1" noChangeShapeType="1" noTextEdit="1"/>
-                </p:cNvSpPr>
-                <p:nvPr/>
-              </p:nvSpPr>
-              <p:spPr>
-                <a:xfrm>
-                  <a:off x="4578228" y="563402"/>
-                  <a:ext cx="1107280" cy="523220"/>
-                </a:xfrm>
-                <a:prstGeom prst="rect">
-                  <a:avLst/>
-                </a:prstGeom>
-                <a:blipFill>
-                  <a:blip r:embed="rId4"/>
-                  <a:stretch>
-                    <a:fillRect/>
-                  </a:stretch>
-                </a:blipFill>
-              </p:spPr>
-              <p:txBody>
-                <a:bodyPr/>
-                <a:lstStyle/>
-                <a:p>
-                  <a:r>
-                    <a:rPr lang="fr-CA">
-                      <a:noFill/>
-                    </a:rPr>
-                    <a:t> </a:t>
-                  </a:r>
-                </a:p>
-              </p:txBody>
-            </p:sp>
-          </mc:Fallback>
-        </mc:AlternateContent>
-        <p:sp>
-          <p:nvSpPr>
-            <p:cNvPr id="40" name="Ellipse 39">
-              <a:extLst>
-                <a:ext uri="{FF2B5EF4-FFF2-40B4-BE49-F238E27FC236}">
-                  <a16:creationId xmlns:a16="http://schemas.microsoft.com/office/drawing/2014/main" id="{D91AF216-F953-E84C-A8C1-C750E6121663}"/>
-                </a:ext>
-              </a:extLst>
-            </p:cNvPr>
-            <p:cNvSpPr/>
-            <p:nvPr/>
-          </p:nvSpPr>
-          <p:spPr>
-            <a:xfrm>
-              <a:off x="5306559" y="2297367"/>
-              <a:ext cx="697113" cy="590211"/>
-            </a:xfrm>
-            <a:prstGeom prst="ellipse">
-              <a:avLst/>
-            </a:prstGeom>
-            <a:solidFill>
-              <a:schemeClr val="tx1"/>
-            </a:solidFill>
-          </p:spPr>
-          <p:style>
-            <a:lnRef idx="2">
-              <a:schemeClr val="accent1">
-                <a:shade val="50000"/>
-              </a:schemeClr>
-            </a:lnRef>
-            <a:fillRef idx="1">
-              <a:schemeClr val="accent1"/>
-            </a:fillRef>
-            <a:effectRef idx="0">
-              <a:schemeClr val="accent1"/>
-            </a:effectRef>
-            <a:fontRef idx="minor">
-              <a:schemeClr val="lt1"/>
-            </a:fontRef>
-          </p:style>
-          <p:txBody>
-            <a:bodyPr rtlCol="0" anchor="ctr"/>
-            <a:lstStyle/>
-            <a:p>
-              <a:pPr algn="ctr"/>
-              <a:r>
-                <a:rPr lang="en-CA" sz="2400" dirty="0"/>
-                <a:t>12</a:t>
-              </a:r>
-            </a:p>
-          </p:txBody>
-        </p:sp>
-        <p:sp>
-          <p:nvSpPr>
-            <p:cNvPr id="15" name="Ellipse 14">
-              <a:extLst>
-                <a:ext uri="{FF2B5EF4-FFF2-40B4-BE49-F238E27FC236}">
-                  <a16:creationId xmlns:a16="http://schemas.microsoft.com/office/drawing/2014/main" id="{65B4D761-3140-9A41-8263-736BFFDA0133}"/>
-                </a:ext>
-              </a:extLst>
-            </p:cNvPr>
-            <p:cNvSpPr/>
-            <p:nvPr/>
-          </p:nvSpPr>
-          <p:spPr>
-            <a:xfrm>
-              <a:off x="3563257" y="2301943"/>
-              <a:ext cx="697112" cy="590211"/>
-            </a:xfrm>
-            <a:prstGeom prst="ellipse">
-              <a:avLst/>
-            </a:prstGeom>
-            <a:solidFill>
-              <a:schemeClr val="tx1"/>
-            </a:solidFill>
-          </p:spPr>
-          <p:style>
-            <a:lnRef idx="2">
-              <a:schemeClr val="accent1">
-                <a:shade val="50000"/>
-              </a:schemeClr>
-            </a:lnRef>
-            <a:fillRef idx="1">
-              <a:schemeClr val="accent1"/>
-            </a:fillRef>
-            <a:effectRef idx="0">
-              <a:schemeClr val="accent1"/>
-            </a:effectRef>
-            <a:fontRef idx="minor">
-              <a:schemeClr val="lt1"/>
-            </a:fontRef>
-          </p:style>
-          <p:txBody>
-            <a:bodyPr rtlCol="0" anchor="ctr"/>
-            <a:lstStyle/>
-            <a:p>
-              <a:pPr algn="ctr"/>
-              <a:r>
-                <a:rPr lang="en-CA" sz="2400" dirty="0"/>
-                <a:t>11</a:t>
-              </a:r>
-            </a:p>
-          </p:txBody>
-        </p:sp>
-        <p:sp>
-          <p:nvSpPr>
-            <p:cNvPr id="6" name="Rectangle 5">
-              <a:extLst>
-                <a:ext uri="{FF2B5EF4-FFF2-40B4-BE49-F238E27FC236}">
-                  <a16:creationId xmlns:a16="http://schemas.microsoft.com/office/drawing/2014/main" id="{5F4034AC-020D-D346-82FB-C8E26EC44026}"/>
-                </a:ext>
-              </a:extLst>
-            </p:cNvPr>
-            <p:cNvSpPr/>
-            <p:nvPr/>
-          </p:nvSpPr>
-          <p:spPr>
-            <a:xfrm>
-              <a:off x="3785178" y="2909558"/>
-              <a:ext cx="1983243" cy="434370"/>
-            </a:xfrm>
-            <a:prstGeom prst="rect">
-              <a:avLst/>
-            </a:prstGeom>
-            <a:noFill/>
-            <a:ln>
-              <a:noFill/>
-            </a:ln>
-          </p:spPr>
-          <p:style>
-            <a:lnRef idx="2">
-              <a:schemeClr val="accent1">
-                <a:shade val="50000"/>
-              </a:schemeClr>
-            </a:lnRef>
-            <a:fillRef idx="1">
-              <a:schemeClr val="accent1"/>
-            </a:fillRef>
-            <a:effectRef idx="0">
-              <a:schemeClr val="accent1"/>
-            </a:effectRef>
-            <a:fontRef idx="minor">
-              <a:schemeClr val="lt1"/>
-            </a:fontRef>
-          </p:style>
-          <p:txBody>
-            <a:bodyPr rtlCol="0" anchor="ctr"/>
-            <a:lstStyle/>
-            <a:p>
-              <a:pPr algn="ctr"/>
-              <a:r>
-                <a:rPr lang="en-CA" sz="4000" dirty="0" err="1"/>
-                <a:t>Bois</a:t>
-              </a:r>
-              <a:r>
-                <a:rPr lang="en-CA" sz="4000" dirty="0"/>
-                <a:t> (2) </a:t>
-              </a:r>
-            </a:p>
-          </p:txBody>
-        </p:sp>
-        <p:sp>
-          <p:nvSpPr>
-            <p:cNvPr id="36" name="Ellipse 35">
-              <a:extLst>
-                <a:ext uri="{FF2B5EF4-FFF2-40B4-BE49-F238E27FC236}">
-                  <a16:creationId xmlns:a16="http://schemas.microsoft.com/office/drawing/2014/main" id="{E0D0036F-C871-534D-9340-43B4BCA343B6}"/>
-                </a:ext>
-              </a:extLst>
-            </p:cNvPr>
-            <p:cNvSpPr/>
-            <p:nvPr/>
-          </p:nvSpPr>
-          <p:spPr>
-            <a:xfrm>
-              <a:off x="4427183" y="1284364"/>
-              <a:ext cx="679714" cy="560436"/>
-            </a:xfrm>
-            <a:prstGeom prst="ellipse">
-              <a:avLst/>
-            </a:prstGeom>
-            <a:solidFill>
-              <a:schemeClr val="tx1"/>
-            </a:solidFill>
-          </p:spPr>
-          <p:style>
-            <a:lnRef idx="2">
-              <a:schemeClr val="accent1">
-                <a:shade val="50000"/>
-              </a:schemeClr>
-            </a:lnRef>
-            <a:fillRef idx="1">
-              <a:schemeClr val="accent1"/>
-            </a:fillRef>
-            <a:effectRef idx="0">
-              <a:schemeClr val="accent1"/>
-            </a:effectRef>
-            <a:fontRef idx="minor">
-              <a:schemeClr val="lt1"/>
-            </a:fontRef>
-          </p:style>
-          <p:txBody>
-            <a:bodyPr rtlCol="0" anchor="ctr"/>
-            <a:lstStyle/>
-            <a:p>
-              <a:pPr algn="ctr"/>
-              <a:r>
-                <a:rPr lang="en-CA" sz="2400" dirty="0"/>
-                <a:t>4</a:t>
-              </a:r>
+              <a:endParaRPr lang="fr-CA" sz="2400" dirty="0"/>
             </a:p>
           </p:txBody>
         </p:sp>
       </p:grpSp>
       <p:grpSp>
         <p:nvGrpSpPr>
-          <p:cNvPr id="17" name="Groupe 16">
+          <p:cNvPr id="14" name="Groupe 13">
             <a:extLst>
               <a:ext uri="{FF2B5EF4-FFF2-40B4-BE49-F238E27FC236}">
-                <a16:creationId xmlns:a16="http://schemas.microsoft.com/office/drawing/2014/main" id="{A8900877-180A-4785-AA38-F3D6D57A35BE}"/>
+                <a16:creationId xmlns:a16="http://schemas.microsoft.com/office/drawing/2014/main" id="{B84C0D96-4819-42BB-821F-22BF82664FB1}"/>
               </a:ext>
             </a:extLst>
           </p:cNvPr>
@@ -20997,91 +21094,1050 @@
           <a:xfrm>
             <a:off x="5923895" y="2404570"/>
             <a:ext cx="6098959" cy="4134367"/>
-            <a:chOff x="5818405" y="2319359"/>
+            <a:chOff x="5923895" y="2404570"/>
             <a:chExt cx="6098959" cy="4134367"/>
           </a:xfrm>
         </p:grpSpPr>
-        <p:sp>
-          <p:nvSpPr>
-            <p:cNvPr id="38" name="Rectangle 37">
+        <p:grpSp>
+          <p:nvGrpSpPr>
+            <p:cNvPr id="17" name="Groupe 16">
               <a:extLst>
                 <a:ext uri="{FF2B5EF4-FFF2-40B4-BE49-F238E27FC236}">
-                  <a16:creationId xmlns:a16="http://schemas.microsoft.com/office/drawing/2014/main" id="{F6CD8E88-7C46-4AD0-B569-DEF362751E47}"/>
+                  <a16:creationId xmlns:a16="http://schemas.microsoft.com/office/drawing/2014/main" id="{A8900877-180A-4785-AA38-F3D6D57A35BE}"/>
                 </a:ext>
               </a:extLst>
             </p:cNvPr>
-            <p:cNvSpPr/>
+            <p:cNvGrpSpPr/>
             <p:nvPr/>
-          </p:nvSpPr>
-          <p:spPr>
+          </p:nvGrpSpPr>
+          <p:grpSpPr>
             <a:xfrm>
-              <a:off x="5818405" y="2319359"/>
+              <a:off x="5923895" y="2404570"/>
               <a:ext cx="6098959" cy="4134367"/>
+              <a:chOff x="5818405" y="2319359"/>
+              <a:chExt cx="6098959" cy="4134367"/>
             </a:xfrm>
-            <a:prstGeom prst="rect">
-              <a:avLst/>
-            </a:prstGeom>
-          </p:spPr>
-          <p:style>
-            <a:lnRef idx="2">
-              <a:schemeClr val="accent1">
-                <a:shade val="50000"/>
-              </a:schemeClr>
-            </a:lnRef>
-            <a:fillRef idx="1">
-              <a:schemeClr val="accent1"/>
-            </a:fillRef>
-            <a:effectRef idx="0">
-              <a:schemeClr val="accent1"/>
-            </a:effectRef>
-            <a:fontRef idx="minor">
-              <a:schemeClr val="lt1"/>
-            </a:fontRef>
-          </p:style>
-          <p:txBody>
-            <a:bodyPr rtlCol="0" anchor="ctr"/>
-            <a:lstStyle/>
-            <a:p>
-              <a:pPr algn="ctr"/>
-              <a:endParaRPr lang="en-CA" sz="2400" dirty="0"/>
-            </a:p>
-          </p:txBody>
-        </p:sp>
-        <p:pic>
-          <p:nvPicPr>
-            <p:cNvPr id="9" name="Image 8">
+          </p:grpSpPr>
+          <p:sp>
+            <p:nvSpPr>
+              <p:cNvPr id="38" name="Rectangle 37">
+                <a:extLst>
+                  <a:ext uri="{FF2B5EF4-FFF2-40B4-BE49-F238E27FC236}">
+                    <a16:creationId xmlns:a16="http://schemas.microsoft.com/office/drawing/2014/main" id="{F6CD8E88-7C46-4AD0-B569-DEF362751E47}"/>
+                  </a:ext>
+                </a:extLst>
+              </p:cNvPr>
+              <p:cNvSpPr/>
+              <p:nvPr/>
+            </p:nvSpPr>
+            <p:spPr>
+              <a:xfrm>
+                <a:off x="5818405" y="2319359"/>
+                <a:ext cx="6098959" cy="4134367"/>
+              </a:xfrm>
+              <a:prstGeom prst="rect">
+                <a:avLst/>
+              </a:prstGeom>
+            </p:spPr>
+            <p:style>
+              <a:lnRef idx="2">
+                <a:schemeClr val="accent1">
+                  <a:shade val="50000"/>
+                </a:schemeClr>
+              </a:lnRef>
+              <a:fillRef idx="1">
+                <a:schemeClr val="accent1"/>
+              </a:fillRef>
+              <a:effectRef idx="0">
+                <a:schemeClr val="accent1"/>
+              </a:effectRef>
+              <a:fontRef idx="minor">
+                <a:schemeClr val="lt1"/>
+              </a:fontRef>
+            </p:style>
+            <p:txBody>
+              <a:bodyPr rtlCol="0" anchor="ctr"/>
+              <a:lstStyle/>
+              <a:p>
+                <a:pPr algn="ctr"/>
+                <a:endParaRPr lang="en-CA" sz="2400" dirty="0"/>
+              </a:p>
+            </p:txBody>
+          </p:sp>
+          <p:pic>
+            <p:nvPicPr>
+              <p:cNvPr id="9" name="Image 8">
+                <a:extLst>
+                  <a:ext uri="{FF2B5EF4-FFF2-40B4-BE49-F238E27FC236}">
+                    <a16:creationId xmlns:a16="http://schemas.microsoft.com/office/drawing/2014/main" id="{5231CE66-E200-44DC-AA37-896A6C6EC606}"/>
+                  </a:ext>
+                </a:extLst>
+              </p:cNvPr>
+              <p:cNvPicPr>
+                <a:picLocks noChangeAspect="1"/>
+              </p:cNvPicPr>
+              <p:nvPr/>
+            </p:nvPicPr>
+            <p:blipFill rotWithShape="1">
+              <a:blip r:embed="rId5"/>
+              <a:srcRect b="36034"/>
+              <a:stretch/>
+            </p:blipFill>
+            <p:spPr>
+              <a:xfrm>
+                <a:off x="7084549" y="3771579"/>
+                <a:ext cx="4024511" cy="1456901"/>
+              </a:xfrm>
+              <a:prstGeom prst="rect">
+                <a:avLst/>
+              </a:prstGeom>
+            </p:spPr>
+          </p:pic>
+          <p:cxnSp>
+            <p:nvCxnSpPr>
+              <p:cNvPr id="41" name="Connecteur droit avec flèche 40">
+                <a:extLst>
+                  <a:ext uri="{FF2B5EF4-FFF2-40B4-BE49-F238E27FC236}">
+                    <a16:creationId xmlns:a16="http://schemas.microsoft.com/office/drawing/2014/main" id="{89209588-8947-4BDF-9F29-CE0A86879A25}"/>
+                  </a:ext>
+                </a:extLst>
+              </p:cNvPr>
+              <p:cNvCxnSpPr>
+                <a:cxnSpLocks/>
+              </p:cNvCxnSpPr>
+              <p:nvPr/>
+            </p:nvCxnSpPr>
+            <p:spPr>
+              <a:xfrm flipV="1">
+                <a:off x="9858991" y="3269817"/>
+                <a:ext cx="299944" cy="709166"/>
+              </a:xfrm>
+              <a:prstGeom prst="straightConnector1">
+                <a:avLst/>
+              </a:prstGeom>
+              <a:ln w="38100">
+                <a:solidFill>
+                  <a:schemeClr val="bg1"/>
+                </a:solidFill>
+                <a:tailEnd type="triangle"/>
+              </a:ln>
+            </p:spPr>
+            <p:style>
+              <a:lnRef idx="1">
+                <a:schemeClr val="accent1"/>
+              </a:lnRef>
+              <a:fillRef idx="0">
+                <a:schemeClr val="accent1"/>
+              </a:fillRef>
+              <a:effectRef idx="0">
+                <a:schemeClr val="accent1"/>
+              </a:effectRef>
+              <a:fontRef idx="minor">
+                <a:schemeClr val="tx1"/>
+              </a:fontRef>
+            </p:style>
+          </p:cxnSp>
+          <p:cxnSp>
+            <p:nvCxnSpPr>
+              <p:cNvPr id="42" name="Connecteur droit avec flèche 41">
+                <a:extLst>
+                  <a:ext uri="{FF2B5EF4-FFF2-40B4-BE49-F238E27FC236}">
+                    <a16:creationId xmlns:a16="http://schemas.microsoft.com/office/drawing/2014/main" id="{1EC9765B-BECB-4788-A8A9-FF73B1A948B6}"/>
+                  </a:ext>
+                </a:extLst>
+              </p:cNvPr>
+              <p:cNvCxnSpPr>
+                <a:cxnSpLocks/>
+              </p:cNvCxnSpPr>
+              <p:nvPr/>
+            </p:nvCxnSpPr>
+            <p:spPr>
+              <a:xfrm flipH="1" flipV="1">
+                <a:off x="7194780" y="3771579"/>
+                <a:ext cx="592269" cy="614963"/>
+              </a:xfrm>
+              <a:prstGeom prst="straightConnector1">
+                <a:avLst/>
+              </a:prstGeom>
+              <a:ln w="38100">
+                <a:solidFill>
+                  <a:schemeClr val="bg1"/>
+                </a:solidFill>
+                <a:tailEnd type="triangle"/>
+              </a:ln>
+            </p:spPr>
+            <p:style>
+              <a:lnRef idx="1">
+                <a:schemeClr val="accent1"/>
+              </a:lnRef>
+              <a:fillRef idx="0">
+                <a:schemeClr val="accent1"/>
+              </a:fillRef>
+              <a:effectRef idx="0">
+                <a:schemeClr val="accent1"/>
+              </a:effectRef>
+              <a:fontRef idx="minor">
+                <a:schemeClr val="tx1"/>
+              </a:fontRef>
+            </p:style>
+          </p:cxnSp>
+          <p:cxnSp>
+            <p:nvCxnSpPr>
+              <p:cNvPr id="43" name="Connecteur droit avec flèche 42">
+                <a:extLst>
+                  <a:ext uri="{FF2B5EF4-FFF2-40B4-BE49-F238E27FC236}">
+                    <a16:creationId xmlns:a16="http://schemas.microsoft.com/office/drawing/2014/main" id="{96432015-3AEC-40AF-8B4B-9FF031CDF58C}"/>
+                  </a:ext>
+                </a:extLst>
+              </p:cNvPr>
+              <p:cNvCxnSpPr>
+                <a:cxnSpLocks/>
+              </p:cNvCxnSpPr>
+              <p:nvPr/>
+            </p:nvCxnSpPr>
+            <p:spPr>
+              <a:xfrm>
+                <a:off x="6245761" y="2744950"/>
+                <a:ext cx="1150030" cy="0"/>
+              </a:xfrm>
+              <a:prstGeom prst="straightConnector1">
+                <a:avLst/>
+              </a:prstGeom>
+              <a:ln w="76200">
+                <a:solidFill>
+                  <a:schemeClr val="tx1">
+                    <a:lumMod val="95000"/>
+                    <a:lumOff val="5000"/>
+                  </a:schemeClr>
+                </a:solidFill>
+                <a:tailEnd type="triangle"/>
+              </a:ln>
+            </p:spPr>
+            <p:style>
+              <a:lnRef idx="1">
+                <a:schemeClr val="accent1"/>
+              </a:lnRef>
+              <a:fillRef idx="0">
+                <a:schemeClr val="accent1"/>
+              </a:fillRef>
+              <a:effectRef idx="0">
+                <a:schemeClr val="accent1"/>
+              </a:effectRef>
+              <a:fontRef idx="minor">
+                <a:schemeClr val="tx1"/>
+              </a:fontRef>
+            </p:style>
+          </p:cxnSp>
+          <p:cxnSp>
+            <p:nvCxnSpPr>
+              <p:cNvPr id="44" name="Connecteur droit avec flèche 43">
+                <a:extLst>
+                  <a:ext uri="{FF2B5EF4-FFF2-40B4-BE49-F238E27FC236}">
+                    <a16:creationId xmlns:a16="http://schemas.microsoft.com/office/drawing/2014/main" id="{53B4E427-AE46-448B-AF16-3DB07D8CAC0B}"/>
+                  </a:ext>
+                </a:extLst>
+              </p:cNvPr>
+              <p:cNvCxnSpPr>
+                <a:cxnSpLocks/>
+              </p:cNvCxnSpPr>
+              <p:nvPr/>
+            </p:nvCxnSpPr>
+            <p:spPr>
+              <a:xfrm>
+                <a:off x="6278419" y="2744950"/>
+                <a:ext cx="0" cy="1156946"/>
+              </a:xfrm>
+              <a:prstGeom prst="straightConnector1">
+                <a:avLst/>
+              </a:prstGeom>
+              <a:ln w="76200">
+                <a:solidFill>
+                  <a:schemeClr val="tx1">
+                    <a:lumMod val="95000"/>
+                    <a:lumOff val="5000"/>
+                  </a:schemeClr>
+                </a:solidFill>
+                <a:tailEnd type="triangle"/>
+              </a:ln>
+            </p:spPr>
+            <p:style>
+              <a:lnRef idx="1">
+                <a:schemeClr val="accent1"/>
+              </a:lnRef>
+              <a:fillRef idx="0">
+                <a:schemeClr val="accent1"/>
+              </a:fillRef>
+              <a:effectRef idx="0">
+                <a:schemeClr val="accent1"/>
+              </a:effectRef>
+              <a:fontRef idx="minor">
+                <a:schemeClr val="tx1"/>
+              </a:fontRef>
+            </p:style>
+          </p:cxnSp>
+          <p:sp>
+            <p:nvSpPr>
+              <p:cNvPr id="45" name="ZoneTexte 44">
+                <a:extLst>
+                  <a:ext uri="{FF2B5EF4-FFF2-40B4-BE49-F238E27FC236}">
+                    <a16:creationId xmlns:a16="http://schemas.microsoft.com/office/drawing/2014/main" id="{F981891D-BDF0-4BAE-A32D-CE0702C8952E}"/>
+                  </a:ext>
+                </a:extLst>
+              </p:cNvPr>
+              <p:cNvSpPr txBox="1"/>
+              <p:nvPr/>
+            </p:nvSpPr>
+            <p:spPr>
+              <a:xfrm>
+                <a:off x="7518566" y="2624955"/>
+                <a:ext cx="533400" cy="646331"/>
+              </a:xfrm>
+              <a:prstGeom prst="rect">
+                <a:avLst/>
+              </a:prstGeom>
+              <a:noFill/>
+            </p:spPr>
+            <p:txBody>
+              <a:bodyPr wrap="square" rtlCol="0">
+                <a:spAutoFit/>
+              </a:bodyPr>
+              <a:lstStyle/>
+              <a:p>
+                <a:r>
+                  <a:rPr lang="en-CA" sz="3600" dirty="0"/>
+                  <a:t>x</a:t>
+                </a:r>
+              </a:p>
+            </p:txBody>
+          </p:sp>
+          <p:sp>
+            <p:nvSpPr>
+              <p:cNvPr id="46" name="ZoneTexte 45">
+                <a:extLst>
+                  <a:ext uri="{FF2B5EF4-FFF2-40B4-BE49-F238E27FC236}">
+                    <a16:creationId xmlns:a16="http://schemas.microsoft.com/office/drawing/2014/main" id="{DE230A6E-E9C4-40CC-B1AD-A66CB0195AB5}"/>
+                  </a:ext>
+                </a:extLst>
+              </p:cNvPr>
+              <p:cNvSpPr txBox="1"/>
+              <p:nvPr/>
+            </p:nvSpPr>
+            <p:spPr>
+              <a:xfrm>
+                <a:off x="6241906" y="3851812"/>
+                <a:ext cx="533400" cy="584775"/>
+              </a:xfrm>
+              <a:prstGeom prst="rect">
+                <a:avLst/>
+              </a:prstGeom>
+              <a:noFill/>
+            </p:spPr>
+            <p:txBody>
+              <a:bodyPr wrap="square" rtlCol="0">
+                <a:spAutoFit/>
+              </a:bodyPr>
+              <a:lstStyle/>
+              <a:p>
+                <a:r>
+                  <a:rPr lang="en-CA" sz="3200" dirty="0"/>
+                  <a:t>y</a:t>
+                </a:r>
+              </a:p>
+            </p:txBody>
+          </p:sp>
+          <mc:AlternateContent xmlns:mc="http://schemas.openxmlformats.org/markup-compatibility/2006" xmlns:a14="http://schemas.microsoft.com/office/drawing/2010/main">
+            <mc:Choice Requires="a14">
+              <p:sp>
+                <p:nvSpPr>
+                  <p:cNvPr id="47" name="ZoneTexte 46">
+                    <a:extLst>
+                      <a:ext uri="{FF2B5EF4-FFF2-40B4-BE49-F238E27FC236}">
+                        <a16:creationId xmlns:a16="http://schemas.microsoft.com/office/drawing/2014/main" id="{F7B781AE-6F9B-4B01-8903-DF07D0F2D2DC}"/>
+                      </a:ext>
+                    </a:extLst>
+                  </p:cNvPr>
+                  <p:cNvSpPr txBox="1"/>
+                  <p:nvPr/>
+                </p:nvSpPr>
+                <p:spPr>
+                  <a:xfrm>
+                    <a:off x="9942765" y="2985354"/>
+                    <a:ext cx="1107280" cy="523220"/>
+                  </a:xfrm>
+                  <a:prstGeom prst="rect">
+                    <a:avLst/>
+                  </a:prstGeom>
+                  <a:noFill/>
+                </p:spPr>
+                <p:txBody>
+                  <a:bodyPr wrap="square" rtlCol="0">
+                    <a:spAutoFit/>
+                  </a:bodyPr>
+                  <a:lstStyle/>
+                  <a:p>
+                    <a:pPr/>
+                    <a14:m>
+                      <m:oMathPara xmlns:m="http://schemas.openxmlformats.org/officeDocument/2006/math">
+                        <m:oMathParaPr>
+                          <m:jc m:val="centerGroup"/>
+                        </m:oMathParaPr>
+                        <m:oMath xmlns:m="http://schemas.openxmlformats.org/officeDocument/2006/math">
+                          <m:sSub>
+                            <m:sSubPr>
+                              <m:ctrlPr>
+                                <a:rPr lang="fr-CA" sz="2800" b="0" i="1" smtClean="0">
+                                  <a:solidFill>
+                                    <a:schemeClr val="bg1"/>
+                                  </a:solidFill>
+                                  <a:latin typeface="Cambria Math" panose="02040503050406030204" pitchFamily="18" charset="0"/>
+                                </a:rPr>
+                              </m:ctrlPr>
+                            </m:sSubPr>
+                            <m:e>
+                              <m:acc>
+                                <m:accPr>
+                                  <m:chr m:val="̂"/>
+                                  <m:ctrlPr>
+                                    <a:rPr lang="fr-CA" sz="2800" b="0" i="1" smtClean="0">
+                                      <a:solidFill>
+                                        <a:schemeClr val="bg1"/>
+                                      </a:solidFill>
+                                      <a:latin typeface="Cambria Math" panose="02040503050406030204" pitchFamily="18" charset="0"/>
+                                    </a:rPr>
+                                  </m:ctrlPr>
+                                </m:accPr>
+                                <m:e>
+                                  <m:r>
+                                    <a:rPr lang="fr-CA" sz="2800" b="0" i="1" smtClean="0">
+                                      <a:solidFill>
+                                        <a:schemeClr val="bg1"/>
+                                      </a:solidFill>
+                                      <a:latin typeface="Cambria Math" panose="02040503050406030204" pitchFamily="18" charset="0"/>
+                                    </a:rPr>
+                                    <m:t>𝑛</m:t>
+                                  </m:r>
+                                </m:e>
+                              </m:acc>
+                            </m:e>
+                            <m:sub>
+                              <m:r>
+                                <a:rPr lang="fr-CA" sz="2800" b="0" i="1" smtClean="0">
+                                  <a:solidFill>
+                                    <a:schemeClr val="bg1"/>
+                                  </a:solidFill>
+                                  <a:latin typeface="Cambria Math" panose="02040503050406030204" pitchFamily="18" charset="0"/>
+                                </a:rPr>
+                                <m:t>13</m:t>
+                              </m:r>
+                            </m:sub>
+                          </m:sSub>
+                        </m:oMath>
+                      </m:oMathPara>
+                    </a14:m>
+                    <a:endParaRPr lang="en-CA" sz="2800" dirty="0">
+                      <a:solidFill>
+                        <a:schemeClr val="bg1"/>
+                      </a:solidFill>
+                    </a:endParaRPr>
+                  </a:p>
+                </p:txBody>
+              </p:sp>
+            </mc:Choice>
+            <mc:Fallback xmlns="">
+              <p:sp>
+                <p:nvSpPr>
+                  <p:cNvPr id="47" name="ZoneTexte 46">
+                    <a:extLst>
+                      <a:ext uri="{FF2B5EF4-FFF2-40B4-BE49-F238E27FC236}">
+                        <a16:creationId xmlns:a16="http://schemas.microsoft.com/office/drawing/2014/main" id="{F7B781AE-6F9B-4B01-8903-DF07D0F2D2DC}"/>
+                      </a:ext>
+                    </a:extLst>
+                  </p:cNvPr>
+                  <p:cNvSpPr txBox="1">
+                    <a:spLocks noRot="1" noChangeAspect="1" noMove="1" noResize="1" noEditPoints="1" noAdjustHandles="1" noChangeArrowheads="1" noChangeShapeType="1" noTextEdit="1"/>
+                  </p:cNvSpPr>
+                  <p:nvPr/>
+                </p:nvSpPr>
+                <p:spPr>
+                  <a:xfrm>
+                    <a:off x="9942765" y="2985354"/>
+                    <a:ext cx="1107280" cy="523220"/>
+                  </a:xfrm>
+                  <a:prstGeom prst="rect">
+                    <a:avLst/>
+                  </a:prstGeom>
+                  <a:blipFill>
+                    <a:blip r:embed="rId6"/>
+                    <a:stretch>
+                      <a:fillRect/>
+                    </a:stretch>
+                  </a:blipFill>
+                </p:spPr>
+                <p:txBody>
+                  <a:bodyPr/>
+                  <a:lstStyle/>
+                  <a:p>
+                    <a:r>
+                      <a:rPr lang="fr-CA">
+                        <a:noFill/>
+                      </a:rPr>
+                      <a:t> </a:t>
+                    </a:r>
+                  </a:p>
+                </p:txBody>
+              </p:sp>
+            </mc:Fallback>
+          </mc:AlternateContent>
+          <mc:AlternateContent xmlns:mc="http://schemas.openxmlformats.org/markup-compatibility/2006" xmlns:a14="http://schemas.microsoft.com/office/drawing/2010/main">
+            <mc:Choice Requires="a14">
+              <p:sp>
+                <p:nvSpPr>
+                  <p:cNvPr id="48" name="ZoneTexte 47">
+                    <a:extLst>
+                      <a:ext uri="{FF2B5EF4-FFF2-40B4-BE49-F238E27FC236}">
+                        <a16:creationId xmlns:a16="http://schemas.microsoft.com/office/drawing/2014/main" id="{93E8CE75-3202-4CEE-BF3A-FC9FFA0F84B5}"/>
+                      </a:ext>
+                    </a:extLst>
+                  </p:cNvPr>
+                  <p:cNvSpPr txBox="1"/>
+                  <p:nvPr/>
+                </p:nvSpPr>
+                <p:spPr>
+                  <a:xfrm>
+                    <a:off x="6822094" y="3277896"/>
+                    <a:ext cx="1107280" cy="523220"/>
+                  </a:xfrm>
+                  <a:prstGeom prst="rect">
+                    <a:avLst/>
+                  </a:prstGeom>
+                  <a:noFill/>
+                </p:spPr>
+                <p:txBody>
+                  <a:bodyPr wrap="square" rtlCol="0">
+                    <a:spAutoFit/>
+                  </a:bodyPr>
+                  <a:lstStyle/>
+                  <a:p>
+                    <a:pPr/>
+                    <a14:m>
+                      <m:oMathPara xmlns:m="http://schemas.openxmlformats.org/officeDocument/2006/math">
+                        <m:oMathParaPr>
+                          <m:jc m:val="centerGroup"/>
+                        </m:oMathParaPr>
+                        <m:oMath xmlns:m="http://schemas.openxmlformats.org/officeDocument/2006/math">
+                          <m:sSub>
+                            <m:sSubPr>
+                              <m:ctrlPr>
+                                <a:rPr lang="fr-CA" sz="2800" b="0" i="1" smtClean="0">
+                                  <a:solidFill>
+                                    <a:schemeClr val="bg1"/>
+                                  </a:solidFill>
+                                  <a:latin typeface="Cambria Math" panose="02040503050406030204" pitchFamily="18" charset="0"/>
+                                </a:rPr>
+                              </m:ctrlPr>
+                            </m:sSubPr>
+                            <m:e>
+                              <m:acc>
+                                <m:accPr>
+                                  <m:chr m:val="̂"/>
+                                  <m:ctrlPr>
+                                    <a:rPr lang="fr-CA" sz="2800" b="0" i="1" smtClean="0">
+                                      <a:solidFill>
+                                        <a:schemeClr val="bg1"/>
+                                      </a:solidFill>
+                                      <a:latin typeface="Cambria Math" panose="02040503050406030204" pitchFamily="18" charset="0"/>
+                                    </a:rPr>
+                                  </m:ctrlPr>
+                                </m:accPr>
+                                <m:e>
+                                  <m:r>
+                                    <a:rPr lang="fr-CA" sz="2800" b="0" i="1" smtClean="0">
+                                      <a:solidFill>
+                                        <a:schemeClr val="bg1"/>
+                                      </a:solidFill>
+                                      <a:latin typeface="Cambria Math" panose="02040503050406030204" pitchFamily="18" charset="0"/>
+                                    </a:rPr>
+                                    <m:t>𝑛</m:t>
+                                  </m:r>
+                                </m:e>
+                              </m:acc>
+                            </m:e>
+                            <m:sub>
+                              <m:r>
+                                <a:rPr lang="fr-CA" sz="2800" b="0" i="1" smtClean="0">
+                                  <a:solidFill>
+                                    <a:schemeClr val="bg1"/>
+                                  </a:solidFill>
+                                  <a:latin typeface="Cambria Math" panose="02040503050406030204" pitchFamily="18" charset="0"/>
+                                </a:rPr>
+                                <m:t>13</m:t>
+                              </m:r>
+                            </m:sub>
+                          </m:sSub>
+                        </m:oMath>
+                      </m:oMathPara>
+                    </a14:m>
+                    <a:endParaRPr lang="en-CA" sz="2800" dirty="0">
+                      <a:solidFill>
+                        <a:schemeClr val="bg1"/>
+                      </a:solidFill>
+                    </a:endParaRPr>
+                  </a:p>
+                </p:txBody>
+              </p:sp>
+            </mc:Choice>
+            <mc:Fallback xmlns="">
+              <p:sp>
+                <p:nvSpPr>
+                  <p:cNvPr id="48" name="ZoneTexte 47">
+                    <a:extLst>
+                      <a:ext uri="{FF2B5EF4-FFF2-40B4-BE49-F238E27FC236}">
+                        <a16:creationId xmlns:a16="http://schemas.microsoft.com/office/drawing/2014/main" id="{93E8CE75-3202-4CEE-BF3A-FC9FFA0F84B5}"/>
+                      </a:ext>
+                    </a:extLst>
+                  </p:cNvPr>
+                  <p:cNvSpPr txBox="1">
+                    <a:spLocks noRot="1" noChangeAspect="1" noMove="1" noResize="1" noEditPoints="1" noAdjustHandles="1" noChangeArrowheads="1" noChangeShapeType="1" noTextEdit="1"/>
+                  </p:cNvSpPr>
+                  <p:nvPr/>
+                </p:nvSpPr>
+                <p:spPr>
+                  <a:xfrm>
+                    <a:off x="6822094" y="3277896"/>
+                    <a:ext cx="1107280" cy="523220"/>
+                  </a:xfrm>
+                  <a:prstGeom prst="rect">
+                    <a:avLst/>
+                  </a:prstGeom>
+                  <a:blipFill>
+                    <a:blip r:embed="rId7"/>
+                    <a:stretch>
+                      <a:fillRect/>
+                    </a:stretch>
+                  </a:blipFill>
+                </p:spPr>
+                <p:txBody>
+                  <a:bodyPr/>
+                  <a:lstStyle/>
+                  <a:p>
+                    <a:r>
+                      <a:rPr lang="fr-CA">
+                        <a:noFill/>
+                      </a:rPr>
+                      <a:t> </a:t>
+                    </a:r>
+                  </a:p>
+                </p:txBody>
+              </p:sp>
+            </mc:Fallback>
+          </mc:AlternateContent>
+          <p:cxnSp>
+            <p:nvCxnSpPr>
+              <p:cNvPr id="50" name="Connecteur droit avec flèche 49">
+                <a:extLst>
+                  <a:ext uri="{FF2B5EF4-FFF2-40B4-BE49-F238E27FC236}">
+                    <a16:creationId xmlns:a16="http://schemas.microsoft.com/office/drawing/2014/main" id="{EF4DB140-5459-4698-BC9F-D919DE875A61}"/>
+                  </a:ext>
+                </a:extLst>
+              </p:cNvPr>
+              <p:cNvCxnSpPr>
+                <a:cxnSpLocks/>
+              </p:cNvCxnSpPr>
+              <p:nvPr/>
+            </p:nvCxnSpPr>
+            <p:spPr>
+              <a:xfrm flipV="1">
+                <a:off x="9105450" y="2985354"/>
+                <a:ext cx="0" cy="504656"/>
+              </a:xfrm>
+              <a:prstGeom prst="straightConnector1">
+                <a:avLst/>
+              </a:prstGeom>
+              <a:ln w="38100">
+                <a:solidFill>
+                  <a:schemeClr val="bg1"/>
+                </a:solidFill>
+                <a:tailEnd type="triangle"/>
+              </a:ln>
+            </p:spPr>
+            <p:style>
+              <a:lnRef idx="1">
+                <a:schemeClr val="accent1"/>
+              </a:lnRef>
+              <a:fillRef idx="0">
+                <a:schemeClr val="accent1"/>
+              </a:fillRef>
+              <a:effectRef idx="0">
+                <a:schemeClr val="accent1"/>
+              </a:effectRef>
+              <a:fontRef idx="minor">
+                <a:schemeClr val="tx1"/>
+              </a:fontRef>
+            </p:style>
+          </p:cxnSp>
+          <mc:AlternateContent xmlns:mc="http://schemas.openxmlformats.org/markup-compatibility/2006" xmlns:a14="http://schemas.microsoft.com/office/drawing/2010/main">
+            <mc:Choice Requires="a14">
+              <p:sp>
+                <p:nvSpPr>
+                  <p:cNvPr id="51" name="ZoneTexte 50">
+                    <a:extLst>
+                      <a:ext uri="{FF2B5EF4-FFF2-40B4-BE49-F238E27FC236}">
+                        <a16:creationId xmlns:a16="http://schemas.microsoft.com/office/drawing/2014/main" id="{DD373027-0CC8-409C-A0AD-96404B08D04C}"/>
+                      </a:ext>
+                    </a:extLst>
+                  </p:cNvPr>
+                  <p:cNvSpPr txBox="1"/>
+                  <p:nvPr/>
+                </p:nvSpPr>
+                <p:spPr>
+                  <a:xfrm>
+                    <a:off x="8914062" y="2722964"/>
+                    <a:ext cx="1107280" cy="523220"/>
+                  </a:xfrm>
+                  <a:prstGeom prst="rect">
+                    <a:avLst/>
+                  </a:prstGeom>
+                  <a:noFill/>
+                </p:spPr>
+                <p:txBody>
+                  <a:bodyPr wrap="square" rtlCol="0">
+                    <a:spAutoFit/>
+                  </a:bodyPr>
+                  <a:lstStyle/>
+                  <a:p>
+                    <a:pPr/>
+                    <a14:m>
+                      <m:oMathPara xmlns:m="http://schemas.openxmlformats.org/officeDocument/2006/math">
+                        <m:oMathParaPr>
+                          <m:jc m:val="centerGroup"/>
+                        </m:oMathParaPr>
+                        <m:oMath xmlns:m="http://schemas.openxmlformats.org/officeDocument/2006/math">
+                          <m:sSub>
+                            <m:sSubPr>
+                              <m:ctrlPr>
+                                <a:rPr lang="fr-CA" sz="2800" b="0" i="1" smtClean="0">
+                                  <a:solidFill>
+                                    <a:schemeClr val="bg1"/>
+                                  </a:solidFill>
+                                  <a:latin typeface="Cambria Math" panose="02040503050406030204" pitchFamily="18" charset="0"/>
+                                </a:rPr>
+                              </m:ctrlPr>
+                            </m:sSubPr>
+                            <m:e>
+                              <m:acc>
+                                <m:accPr>
+                                  <m:chr m:val="̂"/>
+                                  <m:ctrlPr>
+                                    <a:rPr lang="fr-CA" sz="2800" b="0" i="1" smtClean="0">
+                                      <a:solidFill>
+                                        <a:schemeClr val="bg1"/>
+                                      </a:solidFill>
+                                      <a:latin typeface="Cambria Math" panose="02040503050406030204" pitchFamily="18" charset="0"/>
+                                    </a:rPr>
+                                  </m:ctrlPr>
+                                </m:accPr>
+                                <m:e>
+                                  <m:r>
+                                    <a:rPr lang="fr-CA" sz="2800" b="0" i="1" smtClean="0">
+                                      <a:solidFill>
+                                        <a:schemeClr val="bg1"/>
+                                      </a:solidFill>
+                                      <a:latin typeface="Cambria Math" panose="02040503050406030204" pitchFamily="18" charset="0"/>
+                                    </a:rPr>
+                                    <m:t>𝑛</m:t>
+                                  </m:r>
+                                </m:e>
+                              </m:acc>
+                            </m:e>
+                            <m:sub>
+                              <m:r>
+                                <a:rPr lang="fr-CA" sz="2800" b="0" i="1" smtClean="0">
+                                  <a:solidFill>
+                                    <a:schemeClr val="bg1"/>
+                                  </a:solidFill>
+                                  <a:latin typeface="Cambria Math" panose="02040503050406030204" pitchFamily="18" charset="0"/>
+                                </a:rPr>
+                                <m:t>13</m:t>
+                              </m:r>
+                            </m:sub>
+                          </m:sSub>
+                        </m:oMath>
+                      </m:oMathPara>
+                    </a14:m>
+                    <a:endParaRPr lang="en-CA" sz="2800" dirty="0">
+                      <a:solidFill>
+                        <a:schemeClr val="bg1"/>
+                      </a:solidFill>
+                    </a:endParaRPr>
+                  </a:p>
+                </p:txBody>
+              </p:sp>
+            </mc:Choice>
+            <mc:Fallback xmlns="">
+              <p:sp>
+                <p:nvSpPr>
+                  <p:cNvPr id="51" name="ZoneTexte 50">
+                    <a:extLst>
+                      <a:ext uri="{FF2B5EF4-FFF2-40B4-BE49-F238E27FC236}">
+                        <a16:creationId xmlns:a16="http://schemas.microsoft.com/office/drawing/2014/main" id="{DD373027-0CC8-409C-A0AD-96404B08D04C}"/>
+                      </a:ext>
+                    </a:extLst>
+                  </p:cNvPr>
+                  <p:cNvSpPr txBox="1">
+                    <a:spLocks noRot="1" noChangeAspect="1" noMove="1" noResize="1" noEditPoints="1" noAdjustHandles="1" noChangeArrowheads="1" noChangeShapeType="1" noTextEdit="1"/>
+                  </p:cNvSpPr>
+                  <p:nvPr/>
+                </p:nvSpPr>
+                <p:spPr>
+                  <a:xfrm>
+                    <a:off x="8914062" y="2722964"/>
+                    <a:ext cx="1107280" cy="523220"/>
+                  </a:xfrm>
+                  <a:prstGeom prst="rect">
+                    <a:avLst/>
+                  </a:prstGeom>
+                  <a:blipFill>
+                    <a:blip r:embed="rId8"/>
+                    <a:stretch>
+                      <a:fillRect/>
+                    </a:stretch>
+                  </a:blipFill>
+                </p:spPr>
+                <p:txBody>
+                  <a:bodyPr/>
+                  <a:lstStyle/>
+                  <a:p>
+                    <a:r>
+                      <a:rPr lang="fr-CA">
+                        <a:noFill/>
+                      </a:rPr>
+                      <a:t> </a:t>
+                    </a:r>
+                  </a:p>
+                </p:txBody>
+              </p:sp>
+            </mc:Fallback>
+          </mc:AlternateContent>
+          <p:sp>
+            <p:nvSpPr>
+              <p:cNvPr id="52" name="Ellipse 51">
+                <a:extLst>
+                  <a:ext uri="{FF2B5EF4-FFF2-40B4-BE49-F238E27FC236}">
+                    <a16:creationId xmlns:a16="http://schemas.microsoft.com/office/drawing/2014/main" id="{6EDDD201-B5AA-4A6F-80D2-D8F202B5D87E}"/>
+                  </a:ext>
+                </a:extLst>
+              </p:cNvPr>
+              <p:cNvSpPr/>
+              <p:nvPr/>
+            </p:nvSpPr>
+            <p:spPr>
+              <a:xfrm>
+                <a:off x="9510434" y="3706289"/>
+                <a:ext cx="697113" cy="590211"/>
+              </a:xfrm>
+              <a:prstGeom prst="ellipse">
+                <a:avLst/>
+              </a:prstGeom>
+              <a:solidFill>
+                <a:schemeClr val="tx1"/>
+              </a:solidFill>
+            </p:spPr>
+            <p:style>
+              <a:lnRef idx="2">
+                <a:schemeClr val="accent1">
+                  <a:shade val="50000"/>
+                </a:schemeClr>
+              </a:lnRef>
+              <a:fillRef idx="1">
+                <a:schemeClr val="accent1"/>
+              </a:fillRef>
+              <a:effectRef idx="0">
+                <a:schemeClr val="accent1"/>
+              </a:effectRef>
+              <a:fontRef idx="minor">
+                <a:schemeClr val="lt1"/>
+              </a:fontRef>
+            </p:style>
+            <p:txBody>
+              <a:bodyPr rtlCol="0" anchor="ctr"/>
+              <a:lstStyle/>
+              <a:p>
+                <a:pPr algn="ctr"/>
+                <a:r>
+                  <a:rPr lang="en-CA" sz="2400" dirty="0"/>
+                  <a:t>13</a:t>
+                </a:r>
+              </a:p>
+            </p:txBody>
+          </p:sp>
+          <p:sp>
+            <p:nvSpPr>
+              <p:cNvPr id="53" name="Ellipse 52">
+                <a:extLst>
+                  <a:ext uri="{FF2B5EF4-FFF2-40B4-BE49-F238E27FC236}">
+                    <a16:creationId xmlns:a16="http://schemas.microsoft.com/office/drawing/2014/main" id="{D226C456-30C3-463F-8FD4-DB7D55C3D00B}"/>
+                  </a:ext>
+                </a:extLst>
+              </p:cNvPr>
+              <p:cNvSpPr/>
+              <p:nvPr/>
+            </p:nvSpPr>
+            <p:spPr>
+              <a:xfrm>
+                <a:off x="7468393" y="4124851"/>
+                <a:ext cx="697112" cy="590211"/>
+              </a:xfrm>
+              <a:prstGeom prst="ellipse">
+                <a:avLst/>
+              </a:prstGeom>
+              <a:solidFill>
+                <a:schemeClr val="tx1"/>
+              </a:solidFill>
+            </p:spPr>
+            <p:style>
+              <a:lnRef idx="2">
+                <a:schemeClr val="accent1">
+                  <a:shade val="50000"/>
+                </a:schemeClr>
+              </a:lnRef>
+              <a:fillRef idx="1">
+                <a:schemeClr val="accent1"/>
+              </a:fillRef>
+              <a:effectRef idx="0">
+                <a:schemeClr val="accent1"/>
+              </a:effectRef>
+              <a:fontRef idx="minor">
+                <a:schemeClr val="lt1"/>
+              </a:fontRef>
+            </p:style>
+            <p:txBody>
+              <a:bodyPr rtlCol="0" anchor="ctr"/>
+              <a:lstStyle/>
+              <a:p>
+                <a:pPr algn="ctr"/>
+                <a:r>
+                  <a:rPr lang="en-CA" sz="2400" dirty="0"/>
+                  <a:t>13</a:t>
+                </a:r>
+              </a:p>
+            </p:txBody>
+          </p:sp>
+          <p:sp>
+            <p:nvSpPr>
+              <p:cNvPr id="54" name="Rectangle 53">
+                <a:extLst>
+                  <a:ext uri="{FF2B5EF4-FFF2-40B4-BE49-F238E27FC236}">
+                    <a16:creationId xmlns:a16="http://schemas.microsoft.com/office/drawing/2014/main" id="{21E8C6B7-043B-4D0C-B1A4-DC4A82781C2E}"/>
+                  </a:ext>
+                </a:extLst>
+              </p:cNvPr>
+              <p:cNvSpPr/>
+              <p:nvPr/>
+            </p:nvSpPr>
+            <p:spPr>
+              <a:xfrm>
+                <a:off x="8113828" y="4577514"/>
+                <a:ext cx="1983243" cy="434370"/>
+              </a:xfrm>
+              <a:prstGeom prst="rect">
+                <a:avLst/>
+              </a:prstGeom>
+              <a:noFill/>
+              <a:ln>
+                <a:noFill/>
+              </a:ln>
+            </p:spPr>
+            <p:style>
+              <a:lnRef idx="2">
+                <a:schemeClr val="accent1">
+                  <a:shade val="50000"/>
+                </a:schemeClr>
+              </a:lnRef>
+              <a:fillRef idx="1">
+                <a:schemeClr val="accent1"/>
+              </a:fillRef>
+              <a:effectRef idx="0">
+                <a:schemeClr val="accent1"/>
+              </a:effectRef>
+              <a:fontRef idx="minor">
+                <a:schemeClr val="lt1"/>
+              </a:fontRef>
+            </p:style>
+            <p:txBody>
+              <a:bodyPr rtlCol="0" anchor="ctr"/>
+              <a:lstStyle/>
+              <a:p>
+                <a:pPr algn="ctr"/>
+                <a:r>
+                  <a:rPr lang="en-CA" sz="4000" dirty="0" err="1"/>
+                  <a:t>Bois</a:t>
+                </a:r>
+                <a:r>
+                  <a:rPr lang="en-CA" sz="4000" dirty="0"/>
+                  <a:t> (2) </a:t>
+                </a:r>
+              </a:p>
+            </p:txBody>
+          </p:sp>
+          <p:sp>
+            <p:nvSpPr>
+              <p:cNvPr id="55" name="Ellipse 54">
+                <a:extLst>
+                  <a:ext uri="{FF2B5EF4-FFF2-40B4-BE49-F238E27FC236}">
+                    <a16:creationId xmlns:a16="http://schemas.microsoft.com/office/drawing/2014/main" id="{9FCD7054-C0DB-49A7-A70B-F8132B02436F}"/>
+                  </a:ext>
+                </a:extLst>
+              </p:cNvPr>
+              <p:cNvSpPr/>
+              <p:nvPr/>
+            </p:nvSpPr>
+            <p:spPr>
+              <a:xfrm>
+                <a:off x="8745291" y="3474163"/>
+                <a:ext cx="703026" cy="560436"/>
+              </a:xfrm>
+              <a:prstGeom prst="ellipse">
+                <a:avLst/>
+              </a:prstGeom>
+              <a:solidFill>
+                <a:schemeClr val="tx1"/>
+              </a:solidFill>
+            </p:spPr>
+            <p:style>
+              <a:lnRef idx="2">
+                <a:schemeClr val="accent1">
+                  <a:shade val="50000"/>
+                </a:schemeClr>
+              </a:lnRef>
+              <a:fillRef idx="1">
+                <a:schemeClr val="accent1"/>
+              </a:fillRef>
+              <a:effectRef idx="0">
+                <a:schemeClr val="accent1"/>
+              </a:effectRef>
+              <a:fontRef idx="minor">
+                <a:schemeClr val="lt1"/>
+              </a:fontRef>
+            </p:style>
+            <p:txBody>
+              <a:bodyPr rtlCol="0" anchor="ctr"/>
+              <a:lstStyle/>
+              <a:p>
+                <a:pPr algn="ctr"/>
+                <a:r>
+                  <a:rPr lang="en-CA" sz="2400" dirty="0"/>
+                  <a:t>13</a:t>
+                </a:r>
+              </a:p>
+            </p:txBody>
+          </p:sp>
+        </p:grpSp>
+        <p:cxnSp>
+          <p:nvCxnSpPr>
+            <p:cNvPr id="10" name="Connecteur droit 9">
               <a:extLst>
                 <a:ext uri="{FF2B5EF4-FFF2-40B4-BE49-F238E27FC236}">
-                  <a16:creationId xmlns:a16="http://schemas.microsoft.com/office/drawing/2014/main" id="{5231CE66-E200-44DC-AA37-896A6C6EC606}"/>
-                </a:ext>
-              </a:extLst>
-            </p:cNvPr>
-            <p:cNvPicPr>
-              <a:picLocks noChangeAspect="1"/>
-            </p:cNvPicPr>
-            <p:nvPr/>
-          </p:nvPicPr>
-          <p:blipFill rotWithShape="1">
-            <a:blip r:embed="rId5"/>
-            <a:srcRect b="36034"/>
-            <a:stretch/>
-          </p:blipFill>
-          <p:spPr>
-            <a:xfrm>
-              <a:off x="7084549" y="3771579"/>
-              <a:ext cx="4024511" cy="1456901"/>
-            </a:xfrm>
-            <a:prstGeom prst="rect">
-              <a:avLst/>
-            </a:prstGeom>
-          </p:spPr>
-        </p:pic>
-        <p:cxnSp>
-          <p:nvCxnSpPr>
-            <p:cNvPr id="41" name="Connecteur droit avec flèche 40">
-              <a:extLst>
-                <a:ext uri="{FF2B5EF4-FFF2-40B4-BE49-F238E27FC236}">
-                  <a16:creationId xmlns:a16="http://schemas.microsoft.com/office/drawing/2014/main" id="{89209588-8947-4BDF-9F29-CE0A86879A25}"/>
+                  <a16:creationId xmlns:a16="http://schemas.microsoft.com/office/drawing/2014/main" id="{564897D3-061C-4914-83C7-BA6BD3B55E1E}"/>
                 </a:ext>
               </a:extLst>
             </p:cNvPr>
@@ -21091,167 +22147,32 @@
             <p:nvPr/>
           </p:nvCxnSpPr>
           <p:spPr>
-            <a:xfrm flipV="1">
-              <a:off x="9858991" y="3269817"/>
-              <a:ext cx="299944" cy="709166"/>
+            <a:xfrm flipH="1">
+              <a:off x="9210940" y="4662725"/>
+              <a:ext cx="1518944" cy="1301341"/>
             </a:xfrm>
-            <a:prstGeom prst="straightConnector1">
+            <a:prstGeom prst="line">
               <a:avLst/>
             </a:prstGeom>
-            <a:ln w="38100">
+            <a:ln w="57150" cap="flat" cmpd="sng" algn="ctr">
               <a:solidFill>
-                <a:schemeClr val="bg1"/>
+                <a:schemeClr val="dk1"/>
               </a:solidFill>
-              <a:tailEnd type="triangle"/>
+              <a:prstDash val="dash"/>
+              <a:round/>
+              <a:headEnd type="none" w="med" len="med"/>
+              <a:tailEnd type="none" w="med" len="med"/>
             </a:ln>
           </p:spPr>
           <p:style>
-            <a:lnRef idx="1">
-              <a:schemeClr val="accent1"/>
+            <a:lnRef idx="0">
+              <a:scrgbClr r="0" g="0" b="0"/>
             </a:lnRef>
             <a:fillRef idx="0">
-              <a:schemeClr val="accent1"/>
+              <a:scrgbClr r="0" g="0" b="0"/>
             </a:fillRef>
             <a:effectRef idx="0">
-              <a:schemeClr val="accent1"/>
-            </a:effectRef>
-            <a:fontRef idx="minor">
-              <a:schemeClr val="tx1"/>
-            </a:fontRef>
-          </p:style>
-        </p:cxnSp>
-        <p:cxnSp>
-          <p:nvCxnSpPr>
-            <p:cNvPr id="42" name="Connecteur droit avec flèche 41">
-              <a:extLst>
-                <a:ext uri="{FF2B5EF4-FFF2-40B4-BE49-F238E27FC236}">
-                  <a16:creationId xmlns:a16="http://schemas.microsoft.com/office/drawing/2014/main" id="{1EC9765B-BECB-4788-A8A9-FF73B1A948B6}"/>
-                </a:ext>
-              </a:extLst>
-            </p:cNvPr>
-            <p:cNvCxnSpPr>
-              <a:cxnSpLocks/>
-            </p:cNvCxnSpPr>
-            <p:nvPr/>
-          </p:nvCxnSpPr>
-          <p:spPr>
-            <a:xfrm flipH="1" flipV="1">
-              <a:off x="7194780" y="3771579"/>
-              <a:ext cx="592269" cy="614963"/>
-            </a:xfrm>
-            <a:prstGeom prst="straightConnector1">
-              <a:avLst/>
-            </a:prstGeom>
-            <a:ln w="38100">
-              <a:solidFill>
-                <a:schemeClr val="bg1"/>
-              </a:solidFill>
-              <a:tailEnd type="triangle"/>
-            </a:ln>
-          </p:spPr>
-          <p:style>
-            <a:lnRef idx="1">
-              <a:schemeClr val="accent1"/>
-            </a:lnRef>
-            <a:fillRef idx="0">
-              <a:schemeClr val="accent1"/>
-            </a:fillRef>
-            <a:effectRef idx="0">
-              <a:schemeClr val="accent1"/>
-            </a:effectRef>
-            <a:fontRef idx="minor">
-              <a:schemeClr val="tx1"/>
-            </a:fontRef>
-          </p:style>
-        </p:cxnSp>
-        <p:cxnSp>
-          <p:nvCxnSpPr>
-            <p:cNvPr id="43" name="Connecteur droit avec flèche 42">
-              <a:extLst>
-                <a:ext uri="{FF2B5EF4-FFF2-40B4-BE49-F238E27FC236}">
-                  <a16:creationId xmlns:a16="http://schemas.microsoft.com/office/drawing/2014/main" id="{96432015-3AEC-40AF-8B4B-9FF031CDF58C}"/>
-                </a:ext>
-              </a:extLst>
-            </p:cNvPr>
-            <p:cNvCxnSpPr>
-              <a:cxnSpLocks/>
-            </p:cNvCxnSpPr>
-            <p:nvPr/>
-          </p:nvCxnSpPr>
-          <p:spPr>
-            <a:xfrm>
-              <a:off x="6245761" y="2744950"/>
-              <a:ext cx="1150030" cy="0"/>
-            </a:xfrm>
-            <a:prstGeom prst="straightConnector1">
-              <a:avLst/>
-            </a:prstGeom>
-            <a:ln w="76200">
-              <a:solidFill>
-                <a:schemeClr val="tx1">
-                  <a:lumMod val="95000"/>
-                  <a:lumOff val="5000"/>
-                </a:schemeClr>
-              </a:solidFill>
-              <a:tailEnd type="triangle"/>
-            </a:ln>
-          </p:spPr>
-          <p:style>
-            <a:lnRef idx="1">
-              <a:schemeClr val="accent1"/>
-            </a:lnRef>
-            <a:fillRef idx="0">
-              <a:schemeClr val="accent1"/>
-            </a:fillRef>
-            <a:effectRef idx="0">
-              <a:schemeClr val="accent1"/>
-            </a:effectRef>
-            <a:fontRef idx="minor">
-              <a:schemeClr val="tx1"/>
-            </a:fontRef>
-          </p:style>
-        </p:cxnSp>
-        <p:cxnSp>
-          <p:nvCxnSpPr>
-            <p:cNvPr id="44" name="Connecteur droit avec flèche 43">
-              <a:extLst>
-                <a:ext uri="{FF2B5EF4-FFF2-40B4-BE49-F238E27FC236}">
-                  <a16:creationId xmlns:a16="http://schemas.microsoft.com/office/drawing/2014/main" id="{53B4E427-AE46-448B-AF16-3DB07D8CAC0B}"/>
-                </a:ext>
-              </a:extLst>
-            </p:cNvPr>
-            <p:cNvCxnSpPr>
-              <a:cxnSpLocks/>
-            </p:cNvCxnSpPr>
-            <p:nvPr/>
-          </p:nvCxnSpPr>
-          <p:spPr>
-            <a:xfrm>
-              <a:off x="6278419" y="2744950"/>
-              <a:ext cx="0" cy="1156946"/>
-            </a:xfrm>
-            <a:prstGeom prst="straightConnector1">
-              <a:avLst/>
-            </a:prstGeom>
-            <a:ln w="76200">
-              <a:solidFill>
-                <a:schemeClr val="tx1">
-                  <a:lumMod val="95000"/>
-                  <a:lumOff val="5000"/>
-                </a:schemeClr>
-              </a:solidFill>
-              <a:tailEnd type="triangle"/>
-            </a:ln>
-          </p:spPr>
-          <p:style>
-            <a:lnRef idx="1">
-              <a:schemeClr val="accent1"/>
-            </a:lnRef>
-            <a:fillRef idx="0">
-              <a:schemeClr val="accent1"/>
-            </a:fillRef>
-            <a:effectRef idx="0">
-              <a:schemeClr val="accent1"/>
+              <a:scrgbClr r="0" g="0" b="0"/>
             </a:effectRef>
             <a:fontRef idx="minor">
               <a:schemeClr val="tx1"/>
@@ -21260,10 +22181,10 @@
         </p:cxnSp>
         <p:sp>
           <p:nvSpPr>
-            <p:cNvPr id="45" name="ZoneTexte 44">
+            <p:cNvPr id="13" name="ZoneTexte 12">
               <a:extLst>
                 <a:ext uri="{FF2B5EF4-FFF2-40B4-BE49-F238E27FC236}">
-                  <a16:creationId xmlns:a16="http://schemas.microsoft.com/office/drawing/2014/main" id="{F981891D-BDF0-4BAE-A32D-CE0702C8952E}"/>
+                  <a16:creationId xmlns:a16="http://schemas.microsoft.com/office/drawing/2014/main" id="{0C9588A8-E319-44FE-9E83-A1596F8571F9}"/>
                 </a:ext>
               </a:extLst>
             </p:cNvPr>
@@ -21272,8 +22193,8 @@
           </p:nvSpPr>
           <p:spPr>
             <a:xfrm>
-              <a:off x="7518566" y="2624955"/>
-              <a:ext cx="533400" cy="646331"/>
+              <a:off x="9884193" y="5254804"/>
+              <a:ext cx="380232" cy="523220"/>
             </a:xfrm>
             <a:prstGeom prst="rect">
               <a:avLst/>
@@ -21281,744 +22202,14 @@
             <a:noFill/>
           </p:spPr>
           <p:txBody>
-            <a:bodyPr wrap="square" rtlCol="0">
+            <a:bodyPr wrap="none" rtlCol="0">
               <a:spAutoFit/>
             </a:bodyPr>
             <a:lstStyle/>
             <a:p>
               <a:r>
-                <a:rPr lang="en-CA" sz="3600" dirty="0"/>
-                <a:t>x</a:t>
-              </a:r>
-            </a:p>
-          </p:txBody>
-        </p:sp>
-        <p:sp>
-          <p:nvSpPr>
-            <p:cNvPr id="46" name="ZoneTexte 45">
-              <a:extLst>
-                <a:ext uri="{FF2B5EF4-FFF2-40B4-BE49-F238E27FC236}">
-                  <a16:creationId xmlns:a16="http://schemas.microsoft.com/office/drawing/2014/main" id="{DE230A6E-E9C4-40CC-B1AD-A66CB0195AB5}"/>
-                </a:ext>
-              </a:extLst>
-            </p:cNvPr>
-            <p:cNvSpPr txBox="1"/>
-            <p:nvPr/>
-          </p:nvSpPr>
-          <p:spPr>
-            <a:xfrm>
-              <a:off x="6241906" y="3851812"/>
-              <a:ext cx="533400" cy="584775"/>
-            </a:xfrm>
-            <a:prstGeom prst="rect">
-              <a:avLst/>
-            </a:prstGeom>
-            <a:noFill/>
-          </p:spPr>
-          <p:txBody>
-            <a:bodyPr wrap="square" rtlCol="0">
-              <a:spAutoFit/>
-            </a:bodyPr>
-            <a:lstStyle/>
-            <a:p>
-              <a:r>
-                <a:rPr lang="en-CA" sz="3200" dirty="0"/>
-                <a:t>y</a:t>
-              </a:r>
-            </a:p>
-          </p:txBody>
-        </p:sp>
-        <mc:AlternateContent xmlns:mc="http://schemas.openxmlformats.org/markup-compatibility/2006">
-          <mc:Choice xmlns:a14="http://schemas.microsoft.com/office/drawing/2010/main" Requires="a14">
-            <p:sp>
-              <p:nvSpPr>
-                <p:cNvPr id="47" name="ZoneTexte 46">
-                  <a:extLst>
-                    <a:ext uri="{FF2B5EF4-FFF2-40B4-BE49-F238E27FC236}">
-                      <a16:creationId xmlns:a16="http://schemas.microsoft.com/office/drawing/2014/main" id="{F7B781AE-6F9B-4B01-8903-DF07D0F2D2DC}"/>
-                    </a:ext>
-                  </a:extLst>
-                </p:cNvPr>
-                <p:cNvSpPr txBox="1"/>
-                <p:nvPr/>
-              </p:nvSpPr>
-              <p:spPr>
-                <a:xfrm>
-                  <a:off x="9942765" y="2985354"/>
-                  <a:ext cx="1107280" cy="523220"/>
-                </a:xfrm>
-                <a:prstGeom prst="rect">
-                  <a:avLst/>
-                </a:prstGeom>
-                <a:noFill/>
-              </p:spPr>
-              <p:txBody>
-                <a:bodyPr wrap="square" rtlCol="0">
-                  <a:spAutoFit/>
-                </a:bodyPr>
-                <a:lstStyle/>
-                <a:p>
-                  <a:pPr/>
-                  <a14:m>
-                    <m:oMathPara xmlns:m="http://schemas.openxmlformats.org/officeDocument/2006/math">
-                      <m:oMathParaPr>
-                        <m:jc m:val="centerGroup"/>
-                      </m:oMathParaPr>
-                      <m:oMath xmlns:m="http://schemas.openxmlformats.org/officeDocument/2006/math">
-                        <m:sSub>
-                          <m:sSubPr>
-                            <m:ctrlPr>
-                              <a:rPr lang="fr-CA" sz="2800" b="0" i="1" smtClean="0">
-                                <a:solidFill>
-                                  <a:schemeClr val="bg1"/>
-                                </a:solidFill>
-                                <a:latin typeface="Cambria Math" panose="02040503050406030204" pitchFamily="18" charset="0"/>
-                              </a:rPr>
-                            </m:ctrlPr>
-                          </m:sSubPr>
-                          <m:e>
-                            <m:acc>
-                              <m:accPr>
-                                <m:chr m:val="̂"/>
-                                <m:ctrlPr>
-                                  <a:rPr lang="fr-CA" sz="2800" b="0" i="1" smtClean="0">
-                                    <a:solidFill>
-                                      <a:schemeClr val="bg1"/>
-                                    </a:solidFill>
-                                    <a:latin typeface="Cambria Math" panose="02040503050406030204" pitchFamily="18" charset="0"/>
-                                  </a:rPr>
-                                </m:ctrlPr>
-                              </m:accPr>
-                              <m:e>
-                                <m:r>
-                                  <a:rPr lang="fr-CA" sz="2800" b="0" i="1" smtClean="0">
-                                    <a:solidFill>
-                                      <a:schemeClr val="bg1"/>
-                                    </a:solidFill>
-                                    <a:latin typeface="Cambria Math" panose="02040503050406030204" pitchFamily="18" charset="0"/>
-                                  </a:rPr>
-                                  <m:t>𝑛</m:t>
-                                </m:r>
-                              </m:e>
-                            </m:acc>
-                          </m:e>
-                          <m:sub>
-                            <m:r>
-                              <a:rPr lang="fr-CA" sz="2800" b="0" i="1" smtClean="0">
-                                <a:solidFill>
-                                  <a:schemeClr val="bg1"/>
-                                </a:solidFill>
-                                <a:latin typeface="Cambria Math" panose="02040503050406030204" pitchFamily="18" charset="0"/>
-                              </a:rPr>
-                              <m:t>1</m:t>
-                            </m:r>
-                            <m:r>
-                              <a:rPr lang="fr-CA" sz="2800" b="0" i="1" smtClean="0">
-                                <a:solidFill>
-                                  <a:schemeClr val="bg1"/>
-                                </a:solidFill>
-                                <a:latin typeface="Cambria Math" panose="02040503050406030204" pitchFamily="18" charset="0"/>
-                              </a:rPr>
-                              <m:t>3</m:t>
-                            </m:r>
-                          </m:sub>
-                        </m:sSub>
-                      </m:oMath>
-                    </m:oMathPara>
-                  </a14:m>
-                  <a:endParaRPr lang="en-CA" sz="2800" dirty="0">
-                    <a:solidFill>
-                      <a:schemeClr val="bg1"/>
-                    </a:solidFill>
-                  </a:endParaRPr>
-                </a:p>
-              </p:txBody>
-            </p:sp>
-          </mc:Choice>
-          <mc:Fallback>
-            <p:sp>
-              <p:nvSpPr>
-                <p:cNvPr id="47" name="ZoneTexte 46">
-                  <a:extLst>
-                    <a:ext uri="{FF2B5EF4-FFF2-40B4-BE49-F238E27FC236}">
-                      <a16:creationId xmlns:a16="http://schemas.microsoft.com/office/drawing/2014/main" id="{F7B781AE-6F9B-4B01-8903-DF07D0F2D2DC}"/>
-                    </a:ext>
-                  </a:extLst>
-                </p:cNvPr>
-                <p:cNvSpPr txBox="1">
-                  <a:spLocks noRot="1" noChangeAspect="1" noMove="1" noResize="1" noEditPoints="1" noAdjustHandles="1" noChangeArrowheads="1" noChangeShapeType="1" noTextEdit="1"/>
-                </p:cNvSpPr>
-                <p:nvPr/>
-              </p:nvSpPr>
-              <p:spPr>
-                <a:xfrm>
-                  <a:off x="9942765" y="2985354"/>
-                  <a:ext cx="1107280" cy="523220"/>
-                </a:xfrm>
-                <a:prstGeom prst="rect">
-                  <a:avLst/>
-                </a:prstGeom>
-                <a:blipFill>
-                  <a:blip r:embed="rId6"/>
-                  <a:stretch>
-                    <a:fillRect/>
-                  </a:stretch>
-                </a:blipFill>
-              </p:spPr>
-              <p:txBody>
-                <a:bodyPr/>
-                <a:lstStyle/>
-                <a:p>
-                  <a:r>
-                    <a:rPr lang="fr-CA">
-                      <a:noFill/>
-                    </a:rPr>
-                    <a:t> </a:t>
-                  </a:r>
-                </a:p>
-              </p:txBody>
-            </p:sp>
-          </mc:Fallback>
-        </mc:AlternateContent>
-        <mc:AlternateContent xmlns:mc="http://schemas.openxmlformats.org/markup-compatibility/2006">
-          <mc:Choice xmlns:a14="http://schemas.microsoft.com/office/drawing/2010/main" Requires="a14">
-            <p:sp>
-              <p:nvSpPr>
-                <p:cNvPr id="48" name="ZoneTexte 47">
-                  <a:extLst>
-                    <a:ext uri="{FF2B5EF4-FFF2-40B4-BE49-F238E27FC236}">
-                      <a16:creationId xmlns:a16="http://schemas.microsoft.com/office/drawing/2014/main" id="{93E8CE75-3202-4CEE-BF3A-FC9FFA0F84B5}"/>
-                    </a:ext>
-                  </a:extLst>
-                </p:cNvPr>
-                <p:cNvSpPr txBox="1"/>
-                <p:nvPr/>
-              </p:nvSpPr>
-              <p:spPr>
-                <a:xfrm>
-                  <a:off x="6822094" y="3277896"/>
-                  <a:ext cx="1107280" cy="523220"/>
-                </a:xfrm>
-                <a:prstGeom prst="rect">
-                  <a:avLst/>
-                </a:prstGeom>
-                <a:noFill/>
-              </p:spPr>
-              <p:txBody>
-                <a:bodyPr wrap="square" rtlCol="0">
-                  <a:spAutoFit/>
-                </a:bodyPr>
-                <a:lstStyle/>
-                <a:p>
-                  <a:pPr/>
-                  <a14:m>
-                    <m:oMathPara xmlns:m="http://schemas.openxmlformats.org/officeDocument/2006/math">
-                      <m:oMathParaPr>
-                        <m:jc m:val="centerGroup"/>
-                      </m:oMathParaPr>
-                      <m:oMath xmlns:m="http://schemas.openxmlformats.org/officeDocument/2006/math">
-                        <m:sSub>
-                          <m:sSubPr>
-                            <m:ctrlPr>
-                              <a:rPr lang="fr-CA" sz="2800" b="0" i="1" smtClean="0">
-                                <a:solidFill>
-                                  <a:schemeClr val="bg1"/>
-                                </a:solidFill>
-                                <a:latin typeface="Cambria Math" panose="02040503050406030204" pitchFamily="18" charset="0"/>
-                              </a:rPr>
-                            </m:ctrlPr>
-                          </m:sSubPr>
-                          <m:e>
-                            <m:acc>
-                              <m:accPr>
-                                <m:chr m:val="̂"/>
-                                <m:ctrlPr>
-                                  <a:rPr lang="fr-CA" sz="2800" b="0" i="1" smtClean="0">
-                                    <a:solidFill>
-                                      <a:schemeClr val="bg1"/>
-                                    </a:solidFill>
-                                    <a:latin typeface="Cambria Math" panose="02040503050406030204" pitchFamily="18" charset="0"/>
-                                  </a:rPr>
-                                </m:ctrlPr>
-                              </m:accPr>
-                              <m:e>
-                                <m:r>
-                                  <a:rPr lang="fr-CA" sz="2800" b="0" i="1" smtClean="0">
-                                    <a:solidFill>
-                                      <a:schemeClr val="bg1"/>
-                                    </a:solidFill>
-                                    <a:latin typeface="Cambria Math" panose="02040503050406030204" pitchFamily="18" charset="0"/>
-                                  </a:rPr>
-                                  <m:t>𝑛</m:t>
-                                </m:r>
-                              </m:e>
-                            </m:acc>
-                          </m:e>
-                          <m:sub>
-                            <m:r>
-                              <a:rPr lang="fr-CA" sz="2800" b="0" i="1" smtClean="0">
-                                <a:solidFill>
-                                  <a:schemeClr val="bg1"/>
-                                </a:solidFill>
-                                <a:latin typeface="Cambria Math" panose="02040503050406030204" pitchFamily="18" charset="0"/>
-                              </a:rPr>
-                              <m:t>13</m:t>
-                            </m:r>
-                          </m:sub>
-                        </m:sSub>
-                      </m:oMath>
-                    </m:oMathPara>
-                  </a14:m>
-                  <a:endParaRPr lang="en-CA" sz="2800" dirty="0">
-                    <a:solidFill>
-                      <a:schemeClr val="bg1"/>
-                    </a:solidFill>
-                  </a:endParaRPr>
-                </a:p>
-              </p:txBody>
-            </p:sp>
-          </mc:Choice>
-          <mc:Fallback>
-            <p:sp>
-              <p:nvSpPr>
-                <p:cNvPr id="48" name="ZoneTexte 47">
-                  <a:extLst>
-                    <a:ext uri="{FF2B5EF4-FFF2-40B4-BE49-F238E27FC236}">
-                      <a16:creationId xmlns:a16="http://schemas.microsoft.com/office/drawing/2014/main" id="{93E8CE75-3202-4CEE-BF3A-FC9FFA0F84B5}"/>
-                    </a:ext>
-                  </a:extLst>
-                </p:cNvPr>
-                <p:cNvSpPr txBox="1">
-                  <a:spLocks noRot="1" noChangeAspect="1" noMove="1" noResize="1" noEditPoints="1" noAdjustHandles="1" noChangeArrowheads="1" noChangeShapeType="1" noTextEdit="1"/>
-                </p:cNvSpPr>
-                <p:nvPr/>
-              </p:nvSpPr>
-              <p:spPr>
-                <a:xfrm>
-                  <a:off x="6822094" y="3277896"/>
-                  <a:ext cx="1107280" cy="523220"/>
-                </a:xfrm>
-                <a:prstGeom prst="rect">
-                  <a:avLst/>
-                </a:prstGeom>
-                <a:blipFill>
-                  <a:blip r:embed="rId7"/>
-                  <a:stretch>
-                    <a:fillRect/>
-                  </a:stretch>
-                </a:blipFill>
-              </p:spPr>
-              <p:txBody>
-                <a:bodyPr/>
-                <a:lstStyle/>
-                <a:p>
-                  <a:r>
-                    <a:rPr lang="fr-CA">
-                      <a:noFill/>
-                    </a:rPr>
-                    <a:t> </a:t>
-                  </a:r>
-                </a:p>
-              </p:txBody>
-            </p:sp>
-          </mc:Fallback>
-        </mc:AlternateContent>
-        <p:cxnSp>
-          <p:nvCxnSpPr>
-            <p:cNvPr id="50" name="Connecteur droit avec flèche 49">
-              <a:extLst>
-                <a:ext uri="{FF2B5EF4-FFF2-40B4-BE49-F238E27FC236}">
-                  <a16:creationId xmlns:a16="http://schemas.microsoft.com/office/drawing/2014/main" id="{EF4DB140-5459-4698-BC9F-D919DE875A61}"/>
-                </a:ext>
-              </a:extLst>
-            </p:cNvPr>
-            <p:cNvCxnSpPr>
-              <a:cxnSpLocks/>
-            </p:cNvCxnSpPr>
-            <p:nvPr/>
-          </p:nvCxnSpPr>
-          <p:spPr>
-            <a:xfrm flipV="1">
-              <a:off x="9105450" y="2985354"/>
-              <a:ext cx="0" cy="504656"/>
-            </a:xfrm>
-            <a:prstGeom prst="straightConnector1">
-              <a:avLst/>
-            </a:prstGeom>
-            <a:ln w="38100">
-              <a:solidFill>
-                <a:schemeClr val="bg1"/>
-              </a:solidFill>
-              <a:tailEnd type="triangle"/>
-            </a:ln>
-          </p:spPr>
-          <p:style>
-            <a:lnRef idx="1">
-              <a:schemeClr val="accent1"/>
-            </a:lnRef>
-            <a:fillRef idx="0">
-              <a:schemeClr val="accent1"/>
-            </a:fillRef>
-            <a:effectRef idx="0">
-              <a:schemeClr val="accent1"/>
-            </a:effectRef>
-            <a:fontRef idx="minor">
-              <a:schemeClr val="tx1"/>
-            </a:fontRef>
-          </p:style>
-        </p:cxnSp>
-        <mc:AlternateContent xmlns:mc="http://schemas.openxmlformats.org/markup-compatibility/2006">
-          <mc:Choice xmlns:a14="http://schemas.microsoft.com/office/drawing/2010/main" Requires="a14">
-            <p:sp>
-              <p:nvSpPr>
-                <p:cNvPr id="51" name="ZoneTexte 50">
-                  <a:extLst>
-                    <a:ext uri="{FF2B5EF4-FFF2-40B4-BE49-F238E27FC236}">
-                      <a16:creationId xmlns:a16="http://schemas.microsoft.com/office/drawing/2014/main" id="{DD373027-0CC8-409C-A0AD-96404B08D04C}"/>
-                    </a:ext>
-                  </a:extLst>
-                </p:cNvPr>
-                <p:cNvSpPr txBox="1"/>
-                <p:nvPr/>
-              </p:nvSpPr>
-              <p:spPr>
-                <a:xfrm>
-                  <a:off x="8914062" y="2722964"/>
-                  <a:ext cx="1107280" cy="523220"/>
-                </a:xfrm>
-                <a:prstGeom prst="rect">
-                  <a:avLst/>
-                </a:prstGeom>
-                <a:noFill/>
-              </p:spPr>
-              <p:txBody>
-                <a:bodyPr wrap="square" rtlCol="0">
-                  <a:spAutoFit/>
-                </a:bodyPr>
-                <a:lstStyle/>
-                <a:p>
-                  <a:pPr/>
-                  <a14:m>
-                    <m:oMathPara xmlns:m="http://schemas.openxmlformats.org/officeDocument/2006/math">
-                      <m:oMathParaPr>
-                        <m:jc m:val="centerGroup"/>
-                      </m:oMathParaPr>
-                      <m:oMath xmlns:m="http://schemas.openxmlformats.org/officeDocument/2006/math">
-                        <m:sSub>
-                          <m:sSubPr>
-                            <m:ctrlPr>
-                              <a:rPr lang="fr-CA" sz="2800" b="0" i="1" smtClean="0">
-                                <a:solidFill>
-                                  <a:schemeClr val="bg1"/>
-                                </a:solidFill>
-                                <a:latin typeface="Cambria Math" panose="02040503050406030204" pitchFamily="18" charset="0"/>
-                              </a:rPr>
-                            </m:ctrlPr>
-                          </m:sSubPr>
-                          <m:e>
-                            <m:acc>
-                              <m:accPr>
-                                <m:chr m:val="̂"/>
-                                <m:ctrlPr>
-                                  <a:rPr lang="fr-CA" sz="2800" b="0" i="1" smtClean="0">
-                                    <a:solidFill>
-                                      <a:schemeClr val="bg1"/>
-                                    </a:solidFill>
-                                    <a:latin typeface="Cambria Math" panose="02040503050406030204" pitchFamily="18" charset="0"/>
-                                  </a:rPr>
-                                </m:ctrlPr>
-                              </m:accPr>
-                              <m:e>
-                                <m:r>
-                                  <a:rPr lang="fr-CA" sz="2800" b="0" i="1" smtClean="0">
-                                    <a:solidFill>
-                                      <a:schemeClr val="bg1"/>
-                                    </a:solidFill>
-                                    <a:latin typeface="Cambria Math" panose="02040503050406030204" pitchFamily="18" charset="0"/>
-                                  </a:rPr>
-                                  <m:t>𝑛</m:t>
-                                </m:r>
-                              </m:e>
-                            </m:acc>
-                          </m:e>
-                          <m:sub>
-                            <m:r>
-                              <a:rPr lang="fr-CA" sz="2800" b="0" i="1" smtClean="0">
-                                <a:solidFill>
-                                  <a:schemeClr val="bg1"/>
-                                </a:solidFill>
-                                <a:latin typeface="Cambria Math" panose="02040503050406030204" pitchFamily="18" charset="0"/>
-                              </a:rPr>
-                              <m:t>13</m:t>
-                            </m:r>
-                          </m:sub>
-                        </m:sSub>
-                      </m:oMath>
-                    </m:oMathPara>
-                  </a14:m>
-                  <a:endParaRPr lang="en-CA" sz="2800" dirty="0">
-                    <a:solidFill>
-                      <a:schemeClr val="bg1"/>
-                    </a:solidFill>
-                  </a:endParaRPr>
-                </a:p>
-              </p:txBody>
-            </p:sp>
-          </mc:Choice>
-          <mc:Fallback>
-            <p:sp>
-              <p:nvSpPr>
-                <p:cNvPr id="51" name="ZoneTexte 50">
-                  <a:extLst>
-                    <a:ext uri="{FF2B5EF4-FFF2-40B4-BE49-F238E27FC236}">
-                      <a16:creationId xmlns:a16="http://schemas.microsoft.com/office/drawing/2014/main" id="{DD373027-0CC8-409C-A0AD-96404B08D04C}"/>
-                    </a:ext>
-                  </a:extLst>
-                </p:cNvPr>
-                <p:cNvSpPr txBox="1">
-                  <a:spLocks noRot="1" noChangeAspect="1" noMove="1" noResize="1" noEditPoints="1" noAdjustHandles="1" noChangeArrowheads="1" noChangeShapeType="1" noTextEdit="1"/>
-                </p:cNvSpPr>
-                <p:nvPr/>
-              </p:nvSpPr>
-              <p:spPr>
-                <a:xfrm>
-                  <a:off x="8914062" y="2722964"/>
-                  <a:ext cx="1107280" cy="523220"/>
-                </a:xfrm>
-                <a:prstGeom prst="rect">
-                  <a:avLst/>
-                </a:prstGeom>
-                <a:blipFill>
-                  <a:blip r:embed="rId8"/>
-                  <a:stretch>
-                    <a:fillRect/>
-                  </a:stretch>
-                </a:blipFill>
-              </p:spPr>
-              <p:txBody>
-                <a:bodyPr/>
-                <a:lstStyle/>
-                <a:p>
-                  <a:r>
-                    <a:rPr lang="fr-CA">
-                      <a:noFill/>
-                    </a:rPr>
-                    <a:t> </a:t>
-                  </a:r>
-                </a:p>
-              </p:txBody>
-            </p:sp>
-          </mc:Fallback>
-        </mc:AlternateContent>
-        <p:sp>
-          <p:nvSpPr>
-            <p:cNvPr id="52" name="Ellipse 51">
-              <a:extLst>
-                <a:ext uri="{FF2B5EF4-FFF2-40B4-BE49-F238E27FC236}">
-                  <a16:creationId xmlns:a16="http://schemas.microsoft.com/office/drawing/2014/main" id="{6EDDD201-B5AA-4A6F-80D2-D8F202B5D87E}"/>
-                </a:ext>
-              </a:extLst>
-            </p:cNvPr>
-            <p:cNvSpPr/>
-            <p:nvPr/>
-          </p:nvSpPr>
-          <p:spPr>
-            <a:xfrm>
-              <a:off x="9510434" y="3706289"/>
-              <a:ext cx="697113" cy="590211"/>
-            </a:xfrm>
-            <a:prstGeom prst="ellipse">
-              <a:avLst/>
-            </a:prstGeom>
-            <a:solidFill>
-              <a:schemeClr val="tx1"/>
-            </a:solidFill>
-          </p:spPr>
-          <p:style>
-            <a:lnRef idx="2">
-              <a:schemeClr val="accent1">
-                <a:shade val="50000"/>
-              </a:schemeClr>
-            </a:lnRef>
-            <a:fillRef idx="1">
-              <a:schemeClr val="accent1"/>
-            </a:fillRef>
-            <a:effectRef idx="0">
-              <a:schemeClr val="accent1"/>
-            </a:effectRef>
-            <a:fontRef idx="minor">
-              <a:schemeClr val="lt1"/>
-            </a:fontRef>
-          </p:style>
-          <p:txBody>
-            <a:bodyPr rtlCol="0" anchor="ctr"/>
-            <a:lstStyle/>
-            <a:p>
-              <a:pPr algn="ctr"/>
-              <a:r>
-                <a:rPr lang="en-CA" sz="2400" dirty="0"/>
-                <a:t>13</a:t>
-              </a:r>
-            </a:p>
-          </p:txBody>
-        </p:sp>
-        <p:sp>
-          <p:nvSpPr>
-            <p:cNvPr id="53" name="Ellipse 52">
-              <a:extLst>
-                <a:ext uri="{FF2B5EF4-FFF2-40B4-BE49-F238E27FC236}">
-                  <a16:creationId xmlns:a16="http://schemas.microsoft.com/office/drawing/2014/main" id="{D226C456-30C3-463F-8FD4-DB7D55C3D00B}"/>
-                </a:ext>
-              </a:extLst>
-            </p:cNvPr>
-            <p:cNvSpPr/>
-            <p:nvPr/>
-          </p:nvSpPr>
-          <p:spPr>
-            <a:xfrm>
-              <a:off x="7468393" y="4124851"/>
-              <a:ext cx="697112" cy="590211"/>
-            </a:xfrm>
-            <a:prstGeom prst="ellipse">
-              <a:avLst/>
-            </a:prstGeom>
-            <a:solidFill>
-              <a:schemeClr val="tx1"/>
-            </a:solidFill>
-          </p:spPr>
-          <p:style>
-            <a:lnRef idx="2">
-              <a:schemeClr val="accent1">
-                <a:shade val="50000"/>
-              </a:schemeClr>
-            </a:lnRef>
-            <a:fillRef idx="1">
-              <a:schemeClr val="accent1"/>
-            </a:fillRef>
-            <a:effectRef idx="0">
-              <a:schemeClr val="accent1"/>
-            </a:effectRef>
-            <a:fontRef idx="minor">
-              <a:schemeClr val="lt1"/>
-            </a:fontRef>
-          </p:style>
-          <p:txBody>
-            <a:bodyPr rtlCol="0" anchor="ctr"/>
-            <a:lstStyle/>
-            <a:p>
-              <a:pPr algn="ctr"/>
-              <a:r>
-                <a:rPr lang="en-CA" sz="2400" dirty="0"/>
-                <a:t>13</a:t>
-              </a:r>
-            </a:p>
-          </p:txBody>
-        </p:sp>
-        <p:sp>
-          <p:nvSpPr>
-            <p:cNvPr id="54" name="Rectangle 53">
-              <a:extLst>
-                <a:ext uri="{FF2B5EF4-FFF2-40B4-BE49-F238E27FC236}">
-                  <a16:creationId xmlns:a16="http://schemas.microsoft.com/office/drawing/2014/main" id="{21E8C6B7-043B-4D0C-B1A4-DC4A82781C2E}"/>
-                </a:ext>
-              </a:extLst>
-            </p:cNvPr>
-            <p:cNvSpPr/>
-            <p:nvPr/>
-          </p:nvSpPr>
-          <p:spPr>
-            <a:xfrm>
-              <a:off x="8113828" y="4577514"/>
-              <a:ext cx="1983243" cy="434370"/>
-            </a:xfrm>
-            <a:prstGeom prst="rect">
-              <a:avLst/>
-            </a:prstGeom>
-            <a:noFill/>
-            <a:ln>
-              <a:noFill/>
-            </a:ln>
-          </p:spPr>
-          <p:style>
-            <a:lnRef idx="2">
-              <a:schemeClr val="accent1">
-                <a:shade val="50000"/>
-              </a:schemeClr>
-            </a:lnRef>
-            <a:fillRef idx="1">
-              <a:schemeClr val="accent1"/>
-            </a:fillRef>
-            <a:effectRef idx="0">
-              <a:schemeClr val="accent1"/>
-            </a:effectRef>
-            <a:fontRef idx="minor">
-              <a:schemeClr val="lt1"/>
-            </a:fontRef>
-          </p:style>
-          <p:txBody>
-            <a:bodyPr rtlCol="0" anchor="ctr"/>
-            <a:lstStyle/>
-            <a:p>
-              <a:pPr algn="ctr"/>
-              <a:r>
-                <a:rPr lang="en-CA" sz="4000" dirty="0" err="1"/>
-                <a:t>Bois</a:t>
-              </a:r>
-              <a:r>
-                <a:rPr lang="en-CA" sz="4000" dirty="0"/>
-                <a:t> (2) </a:t>
-              </a:r>
-            </a:p>
-          </p:txBody>
-        </p:sp>
-        <p:sp>
-          <p:nvSpPr>
-            <p:cNvPr id="55" name="Ellipse 54">
-              <a:extLst>
-                <a:ext uri="{FF2B5EF4-FFF2-40B4-BE49-F238E27FC236}">
-                  <a16:creationId xmlns:a16="http://schemas.microsoft.com/office/drawing/2014/main" id="{9FCD7054-C0DB-49A7-A70B-F8132B02436F}"/>
-                </a:ext>
-              </a:extLst>
-            </p:cNvPr>
-            <p:cNvSpPr/>
-            <p:nvPr/>
-          </p:nvSpPr>
-          <p:spPr>
-            <a:xfrm>
-              <a:off x="8745291" y="3474163"/>
-              <a:ext cx="703026" cy="560436"/>
-            </a:xfrm>
-            <a:prstGeom prst="ellipse">
-              <a:avLst/>
-            </a:prstGeom>
-            <a:solidFill>
-              <a:schemeClr val="tx1"/>
-            </a:solidFill>
-          </p:spPr>
-          <p:style>
-            <a:lnRef idx="2">
-              <a:schemeClr val="accent1">
-                <a:shade val="50000"/>
-              </a:schemeClr>
-            </a:lnRef>
-            <a:fillRef idx="1">
-              <a:schemeClr val="accent1"/>
-            </a:fillRef>
-            <a:effectRef idx="0">
-              <a:schemeClr val="accent1"/>
-            </a:effectRef>
-            <a:fontRef idx="minor">
-              <a:schemeClr val="lt1"/>
-            </a:fontRef>
-          </p:style>
-          <p:txBody>
-            <a:bodyPr rtlCol="0" anchor="ctr"/>
-            <a:lstStyle/>
-            <a:p>
-              <a:pPr algn="ctr"/>
-              <a:r>
-                <a:rPr lang="en-CA" sz="2400" dirty="0"/>
-                <a:t>13</a:t>
+                <a:rPr lang="fr-CA" sz="2800" dirty="0"/>
+                <a:t>R</a:t>
               </a:r>
             </a:p>
           </p:txBody>

</xml_diff>